<commit_message>
Adding hard negative sampling notebook (#367)
</commit_message>
<xml_diff>
--- a/scenarios/detection/media/figures.pptx
+++ b/scenarios/detection/media/figures.pptx
@@ -7,6 +7,8 @@
   <p:sldIdLst>
     <p:sldId id="256" r:id="rId2"/>
     <p:sldId id="257" r:id="rId3"/>
+    <p:sldId id="258" r:id="rId4"/>
+    <p:sldId id="259" r:id="rId5"/>
   </p:sldIdLst>
   <p:sldSz cx="12192000" cy="6858000"/>
   <p:notesSz cx="6858000" cy="9144000"/>
@@ -260,7 +262,7 @@
           <a:p>
             <a:fld id="{D0BF518E-5D7A-4393-A390-A9F491FA3F95}" type="datetimeFigureOut">
               <a:rPr lang="en-US" smtClean="0"/>
-              <a:t>8/1/2019</a:t>
+              <a:t>10/16/2019</a:t>
             </a:fld>
             <a:endParaRPr lang="en-US"/>
           </a:p>
@@ -458,7 +460,7 @@
           <a:p>
             <a:fld id="{D0BF518E-5D7A-4393-A390-A9F491FA3F95}" type="datetimeFigureOut">
               <a:rPr lang="en-US" smtClean="0"/>
-              <a:t>8/1/2019</a:t>
+              <a:t>10/16/2019</a:t>
             </a:fld>
             <a:endParaRPr lang="en-US"/>
           </a:p>
@@ -666,7 +668,7 @@
           <a:p>
             <a:fld id="{D0BF518E-5D7A-4393-A390-A9F491FA3F95}" type="datetimeFigureOut">
               <a:rPr lang="en-US" smtClean="0"/>
-              <a:t>8/1/2019</a:t>
+              <a:t>10/16/2019</a:t>
             </a:fld>
             <a:endParaRPr lang="en-US"/>
           </a:p>
@@ -864,7 +866,7 @@
           <a:p>
             <a:fld id="{D0BF518E-5D7A-4393-A390-A9F491FA3F95}" type="datetimeFigureOut">
               <a:rPr lang="en-US" smtClean="0"/>
-              <a:t>8/1/2019</a:t>
+              <a:t>10/16/2019</a:t>
             </a:fld>
             <a:endParaRPr lang="en-US"/>
           </a:p>
@@ -1139,7 +1141,7 @@
           <a:p>
             <a:fld id="{D0BF518E-5D7A-4393-A390-A9F491FA3F95}" type="datetimeFigureOut">
               <a:rPr lang="en-US" smtClean="0"/>
-              <a:t>8/1/2019</a:t>
+              <a:t>10/16/2019</a:t>
             </a:fld>
             <a:endParaRPr lang="en-US"/>
           </a:p>
@@ -1404,7 +1406,7 @@
           <a:p>
             <a:fld id="{D0BF518E-5D7A-4393-A390-A9F491FA3F95}" type="datetimeFigureOut">
               <a:rPr lang="en-US" smtClean="0"/>
-              <a:t>8/1/2019</a:t>
+              <a:t>10/16/2019</a:t>
             </a:fld>
             <a:endParaRPr lang="en-US"/>
           </a:p>
@@ -1816,7 +1818,7 @@
           <a:p>
             <a:fld id="{D0BF518E-5D7A-4393-A390-A9F491FA3F95}" type="datetimeFigureOut">
               <a:rPr lang="en-US" smtClean="0"/>
-              <a:t>8/1/2019</a:t>
+              <a:t>10/16/2019</a:t>
             </a:fld>
             <a:endParaRPr lang="en-US"/>
           </a:p>
@@ -1957,7 +1959,7 @@
           <a:p>
             <a:fld id="{D0BF518E-5D7A-4393-A390-A9F491FA3F95}" type="datetimeFigureOut">
               <a:rPr lang="en-US" smtClean="0"/>
-              <a:t>8/1/2019</a:t>
+              <a:t>10/16/2019</a:t>
             </a:fld>
             <a:endParaRPr lang="en-US"/>
           </a:p>
@@ -2070,7 +2072,7 @@
           <a:p>
             <a:fld id="{D0BF518E-5D7A-4393-A390-A9F491FA3F95}" type="datetimeFigureOut">
               <a:rPr lang="en-US" smtClean="0"/>
-              <a:t>8/1/2019</a:t>
+              <a:t>10/16/2019</a:t>
             </a:fld>
             <a:endParaRPr lang="en-US"/>
           </a:p>
@@ -2381,7 +2383,7 @@
           <a:p>
             <a:fld id="{D0BF518E-5D7A-4393-A390-A9F491FA3F95}" type="datetimeFigureOut">
               <a:rPr lang="en-US" smtClean="0"/>
-              <a:t>8/1/2019</a:t>
+              <a:t>10/16/2019</a:t>
             </a:fld>
             <a:endParaRPr lang="en-US"/>
           </a:p>
@@ -2669,7 +2671,7 @@
           <a:p>
             <a:fld id="{D0BF518E-5D7A-4393-A390-A9F491FA3F95}" type="datetimeFigureOut">
               <a:rPr lang="en-US" smtClean="0"/>
-              <a:t>8/1/2019</a:t>
+              <a:t>10/16/2019</a:t>
             </a:fld>
             <a:endParaRPr lang="en-US"/>
           </a:p>
@@ -2910,7 +2912,7 @@
           <a:p>
             <a:fld id="{D0BF518E-5D7A-4393-A390-A9F491FA3F95}" type="datetimeFigureOut">
               <a:rPr lang="en-US" smtClean="0"/>
-              <a:t>8/1/2019</a:t>
+              <a:t>10/16/2019</a:t>
             </a:fld>
             <a:endParaRPr lang="en-US"/>
           </a:p>
@@ -3813,8 +3815,8 @@
           <a:chExt cx="0" cy="0"/>
         </a:xfrm>
       </p:grpSpPr>
-      <mc:AlternateContent xmlns:mc="http://schemas.openxmlformats.org/markup-compatibility/2006">
-        <mc:Choice xmlns:a14="http://schemas.microsoft.com/office/drawing/2010/main" Requires="a14">
+      <mc:AlternateContent xmlns:mc="http://schemas.openxmlformats.org/markup-compatibility/2006" xmlns:a14="http://schemas.microsoft.com/office/drawing/2010/main">
+        <mc:Choice Requires="a14">
           <p:sp>
             <p:nvSpPr>
               <p:cNvPr id="8" name="TextBox 7">
@@ -3955,7 +3957,7 @@
             </p:txBody>
           </p:sp>
         </mc:Choice>
-        <mc:Fallback>
+        <mc:Fallback xmlns="">
           <p:sp>
             <p:nvSpPr>
               <p:cNvPr id="8" name="TextBox 7">
@@ -4166,6 +4168,3028 @@
     <p:extLst>
       <p:ext uri="{BB962C8B-B14F-4D97-AF65-F5344CB8AC3E}">
         <p14:creationId xmlns:p14="http://schemas.microsoft.com/office/powerpoint/2010/main" val="990216657"/>
+      </p:ext>
+    </p:extLst>
+  </p:cSld>
+  <p:clrMapOvr>
+    <a:masterClrMapping/>
+  </p:clrMapOvr>
+</p:sld>
+</file>
+
+<file path=ppt/slides/slide3.xml><?xml version="1.0" encoding="utf-8"?>
+<p:sld xmlns:a="http://schemas.openxmlformats.org/drawingml/2006/main" xmlns:r="http://schemas.openxmlformats.org/officeDocument/2006/relationships" xmlns:p="http://schemas.openxmlformats.org/presentationml/2006/main">
+  <p:cSld>
+    <p:spTree>
+      <p:nvGrpSpPr>
+        <p:cNvPr id="1" name=""/>
+        <p:cNvGrpSpPr/>
+        <p:nvPr/>
+      </p:nvGrpSpPr>
+      <p:grpSpPr>
+        <a:xfrm>
+          <a:off x="0" y="0"/>
+          <a:ext cx="0" cy="0"/>
+          <a:chOff x="0" y="0"/>
+          <a:chExt cx="0" cy="0"/>
+        </a:xfrm>
+      </p:grpSpPr>
+      <p:sp>
+        <p:nvSpPr>
+          <p:cNvPr id="13" name="Rectangle 12">
+            <a:extLst>
+              <a:ext uri="{FF2B5EF4-FFF2-40B4-BE49-F238E27FC236}">
+                <a16:creationId xmlns:a16="http://schemas.microsoft.com/office/drawing/2014/main" id="{EF8496B6-3831-4053-8C66-8805C4332877}"/>
+              </a:ext>
+            </a:extLst>
+          </p:cNvPr>
+          <p:cNvSpPr/>
+          <p:nvPr/>
+        </p:nvSpPr>
+        <p:spPr>
+          <a:xfrm>
+            <a:off x="957077" y="3050274"/>
+            <a:ext cx="1582549" cy="369332"/>
+          </a:xfrm>
+          <a:prstGeom prst="rect">
+            <a:avLst/>
+          </a:prstGeom>
+        </p:spPr>
+        <p:txBody>
+          <a:bodyPr wrap="none">
+            <a:spAutoFit/>
+          </a:bodyPr>
+          <a:lstStyle/>
+          <a:p>
+            <a:r>
+              <a:rPr lang="en-US" altLang="en-US" dirty="0">
+                <a:latin typeface="Arial" panose="020B0604020202020204" pitchFamily="34" charset="0"/>
+                <a:ea typeface="-apple-system"/>
+              </a:rPr>
+              <a:t>Training set </a:t>
+            </a:r>
+            <a:r>
+              <a:rPr lang="en-US" altLang="en-US" i="1" dirty="0">
+                <a:latin typeface="Arial" panose="020B0604020202020204" pitchFamily="34" charset="0"/>
+                <a:ea typeface="-apple-system"/>
+              </a:rPr>
+              <a:t>T</a:t>
+            </a:r>
+            <a:endParaRPr lang="en-US" i="1" dirty="0"/>
+          </a:p>
+        </p:txBody>
+      </p:sp>
+      <p:grpSp>
+        <p:nvGrpSpPr>
+          <p:cNvPr id="18" name="Group 17">
+            <a:extLst>
+              <a:ext uri="{FF2B5EF4-FFF2-40B4-BE49-F238E27FC236}">
+                <a16:creationId xmlns:a16="http://schemas.microsoft.com/office/drawing/2014/main" id="{14800CAE-1863-4139-A693-3599CDC3E8F8}"/>
+              </a:ext>
+            </a:extLst>
+          </p:cNvPr>
+          <p:cNvGrpSpPr/>
+          <p:nvPr/>
+        </p:nvGrpSpPr>
+        <p:grpSpPr>
+          <a:xfrm>
+            <a:off x="832256" y="622488"/>
+            <a:ext cx="1833331" cy="2407086"/>
+            <a:chOff x="2400300" y="400467"/>
+            <a:chExt cx="2149688" cy="2822449"/>
+          </a:xfrm>
+        </p:grpSpPr>
+        <p:sp>
+          <p:nvSpPr>
+            <p:cNvPr id="14" name="Rectangle 13">
+              <a:extLst>
+                <a:ext uri="{FF2B5EF4-FFF2-40B4-BE49-F238E27FC236}">
+                  <a16:creationId xmlns:a16="http://schemas.microsoft.com/office/drawing/2014/main" id="{C3E20849-527F-4DBA-A488-6D8780372495}"/>
+                </a:ext>
+              </a:extLst>
+            </p:cNvPr>
+            <p:cNvSpPr/>
+            <p:nvPr/>
+          </p:nvSpPr>
+          <p:spPr>
+            <a:xfrm>
+              <a:off x="2607211" y="633844"/>
+              <a:ext cx="1942777" cy="2589072"/>
+            </a:xfrm>
+            <a:prstGeom prst="rect">
+              <a:avLst/>
+            </a:prstGeom>
+            <a:solidFill>
+              <a:schemeClr val="bg1"/>
+            </a:solidFill>
+            <a:ln>
+              <a:solidFill>
+                <a:schemeClr val="tx1"/>
+              </a:solidFill>
+            </a:ln>
+          </p:spPr>
+          <p:style>
+            <a:lnRef idx="2">
+              <a:schemeClr val="accent1">
+                <a:shade val="50000"/>
+              </a:schemeClr>
+            </a:lnRef>
+            <a:fillRef idx="1">
+              <a:schemeClr val="accent1"/>
+            </a:fillRef>
+            <a:effectRef idx="0">
+              <a:schemeClr val="accent1"/>
+            </a:effectRef>
+            <a:fontRef idx="minor">
+              <a:schemeClr val="lt1"/>
+            </a:fontRef>
+          </p:style>
+          <p:txBody>
+            <a:bodyPr rtlCol="0" anchor="ctr"/>
+            <a:lstStyle/>
+            <a:p>
+              <a:pPr algn="ctr"/>
+              <a:endParaRPr lang="en-US"/>
+            </a:p>
+          </p:txBody>
+        </p:sp>
+        <p:sp>
+          <p:nvSpPr>
+            <p:cNvPr id="15" name="Rectangle 14">
+              <a:extLst>
+                <a:ext uri="{FF2B5EF4-FFF2-40B4-BE49-F238E27FC236}">
+                  <a16:creationId xmlns:a16="http://schemas.microsoft.com/office/drawing/2014/main" id="{B63F4B76-5FB1-404F-94AA-BDC2F864C8E1}"/>
+                </a:ext>
+              </a:extLst>
+            </p:cNvPr>
+            <p:cNvSpPr/>
+            <p:nvPr/>
+          </p:nvSpPr>
+          <p:spPr>
+            <a:xfrm>
+              <a:off x="2543825" y="556149"/>
+              <a:ext cx="1942777" cy="2589072"/>
+            </a:xfrm>
+            <a:prstGeom prst="rect">
+              <a:avLst/>
+            </a:prstGeom>
+            <a:solidFill>
+              <a:schemeClr val="bg1"/>
+            </a:solidFill>
+            <a:ln>
+              <a:solidFill>
+                <a:schemeClr val="tx1"/>
+              </a:solidFill>
+            </a:ln>
+          </p:spPr>
+          <p:style>
+            <a:lnRef idx="2">
+              <a:schemeClr val="accent1">
+                <a:shade val="50000"/>
+              </a:schemeClr>
+            </a:lnRef>
+            <a:fillRef idx="1">
+              <a:schemeClr val="accent1"/>
+            </a:fillRef>
+            <a:effectRef idx="0">
+              <a:schemeClr val="accent1"/>
+            </a:effectRef>
+            <a:fontRef idx="minor">
+              <a:schemeClr val="lt1"/>
+            </a:fontRef>
+          </p:style>
+          <p:txBody>
+            <a:bodyPr rtlCol="0" anchor="ctr"/>
+            <a:lstStyle/>
+            <a:p>
+              <a:pPr algn="ctr"/>
+              <a:endParaRPr lang="en-US"/>
+            </a:p>
+          </p:txBody>
+        </p:sp>
+        <p:sp>
+          <p:nvSpPr>
+            <p:cNvPr id="16" name="Rectangle 15">
+              <a:extLst>
+                <a:ext uri="{FF2B5EF4-FFF2-40B4-BE49-F238E27FC236}">
+                  <a16:creationId xmlns:a16="http://schemas.microsoft.com/office/drawing/2014/main" id="{3543D0BD-AD41-4D66-88D6-223BDA0408FE}"/>
+                </a:ext>
+              </a:extLst>
+            </p:cNvPr>
+            <p:cNvSpPr/>
+            <p:nvPr/>
+          </p:nvSpPr>
+          <p:spPr>
+            <a:xfrm>
+              <a:off x="2480439" y="478308"/>
+              <a:ext cx="1942777" cy="2589072"/>
+            </a:xfrm>
+            <a:prstGeom prst="rect">
+              <a:avLst/>
+            </a:prstGeom>
+            <a:solidFill>
+              <a:schemeClr val="bg1"/>
+            </a:solidFill>
+            <a:ln>
+              <a:solidFill>
+                <a:schemeClr val="tx1"/>
+              </a:solidFill>
+            </a:ln>
+          </p:spPr>
+          <p:style>
+            <a:lnRef idx="2">
+              <a:schemeClr val="accent1">
+                <a:shade val="50000"/>
+              </a:schemeClr>
+            </a:lnRef>
+            <a:fillRef idx="1">
+              <a:schemeClr val="accent1"/>
+            </a:fillRef>
+            <a:effectRef idx="0">
+              <a:schemeClr val="accent1"/>
+            </a:effectRef>
+            <a:fontRef idx="minor">
+              <a:schemeClr val="lt1"/>
+            </a:fontRef>
+          </p:style>
+          <p:txBody>
+            <a:bodyPr rtlCol="0" anchor="ctr"/>
+            <a:lstStyle/>
+            <a:p>
+              <a:pPr algn="ctr"/>
+              <a:endParaRPr lang="en-US"/>
+            </a:p>
+          </p:txBody>
+        </p:sp>
+        <p:pic>
+          <p:nvPicPr>
+            <p:cNvPr id="17" name="Picture 16" descr="A close up of a bottle&#10;&#10;Description automatically generated">
+              <a:extLst>
+                <a:ext uri="{FF2B5EF4-FFF2-40B4-BE49-F238E27FC236}">
+                  <a16:creationId xmlns:a16="http://schemas.microsoft.com/office/drawing/2014/main" id="{5C612992-BDED-4A05-A2CC-189896CEAFCA}"/>
+                </a:ext>
+              </a:extLst>
+            </p:cNvPr>
+            <p:cNvPicPr>
+              <a:picLocks noChangeAspect="1"/>
+            </p:cNvPicPr>
+            <p:nvPr/>
+          </p:nvPicPr>
+          <p:blipFill>
+            <a:blip r:embed="rId2">
+              <a:extLst>
+                <a:ext uri="{28A0092B-C50C-407E-A947-70E740481C1C}">
+                  <a14:useLocalDpi xmlns:a14="http://schemas.microsoft.com/office/drawing/2010/main" val="0"/>
+                </a:ext>
+              </a:extLst>
+            </a:blip>
+            <a:stretch>
+              <a:fillRect/>
+            </a:stretch>
+          </p:blipFill>
+          <p:spPr>
+            <a:xfrm>
+              <a:off x="2400300" y="400467"/>
+              <a:ext cx="1942777" cy="2589072"/>
+            </a:xfrm>
+            <a:prstGeom prst="rect">
+              <a:avLst/>
+            </a:prstGeom>
+          </p:spPr>
+        </p:pic>
+      </p:grpSp>
+      <p:pic>
+        <p:nvPicPr>
+          <p:cNvPr id="1027" name="Picture 3" descr="pipeline.jpg">
+            <a:extLst>
+              <a:ext uri="{FF2B5EF4-FFF2-40B4-BE49-F238E27FC236}">
+                <a16:creationId xmlns:a16="http://schemas.microsoft.com/office/drawing/2014/main" id="{BFD15644-B4CD-4D14-B00A-9F7B4BB3AC88}"/>
+              </a:ext>
+            </a:extLst>
+          </p:cNvPr>
+          <p:cNvPicPr>
+            <a:picLocks noChangeAspect="1" noChangeArrowheads="1"/>
+          </p:cNvPicPr>
+          <p:nvPr/>
+        </p:nvPicPr>
+        <p:blipFill rotWithShape="1">
+          <a:blip r:embed="rId3">
+            <a:extLst>
+              <a:ext uri="{28A0092B-C50C-407E-A947-70E740481C1C}">
+                <a14:useLocalDpi xmlns:a14="http://schemas.microsoft.com/office/drawing/2010/main" val="0"/>
+              </a:ext>
+            </a:extLst>
+          </a:blip>
+          <a:srcRect l="45259" t="9629" r="46207" b="60764"/>
+          <a:stretch/>
+        </p:blipFill>
+        <p:spPr bwMode="auto">
+          <a:xfrm>
+            <a:off x="5285307" y="451167"/>
+            <a:ext cx="2134919" cy="2857342"/>
+          </a:xfrm>
+          <a:prstGeom prst="rect">
+            <a:avLst/>
+          </a:prstGeom>
+          <a:noFill/>
+          <a:extLst>
+            <a:ext uri="{909E8E84-426E-40DD-AFC4-6F175D3DCCD1}">
+              <a14:hiddenFill xmlns:a14="http://schemas.microsoft.com/office/drawing/2010/main">
+                <a:solidFill>
+                  <a:srgbClr val="FFFFFF"/>
+                </a:solidFill>
+              </a14:hiddenFill>
+            </a:ext>
+          </a:extLst>
+        </p:spPr>
+      </p:pic>
+      <p:sp>
+        <p:nvSpPr>
+          <p:cNvPr id="21" name="Rectangle 20">
+            <a:extLst>
+              <a:ext uri="{FF2B5EF4-FFF2-40B4-BE49-F238E27FC236}">
+                <a16:creationId xmlns:a16="http://schemas.microsoft.com/office/drawing/2014/main" id="{E1D4DE7A-1D00-4FFF-BC81-1C1A0F6C25FD}"/>
+              </a:ext>
+            </a:extLst>
+          </p:cNvPr>
+          <p:cNvSpPr/>
+          <p:nvPr/>
+        </p:nvSpPr>
+        <p:spPr>
+          <a:xfrm>
+            <a:off x="5847627" y="3004667"/>
+            <a:ext cx="813043" cy="369332"/>
+          </a:xfrm>
+          <a:prstGeom prst="rect">
+            <a:avLst/>
+          </a:prstGeom>
+        </p:spPr>
+        <p:txBody>
+          <a:bodyPr wrap="none">
+            <a:spAutoFit/>
+          </a:bodyPr>
+          <a:lstStyle/>
+          <a:p>
+            <a:r>
+              <a:rPr lang="en-US" altLang="en-US" dirty="0">
+                <a:latin typeface="Arial" panose="020B0604020202020204" pitchFamily="34" charset="0"/>
+                <a:ea typeface="-apple-system"/>
+              </a:rPr>
+              <a:t>Model</a:t>
+            </a:r>
+            <a:endParaRPr lang="en-US" dirty="0"/>
+          </a:p>
+        </p:txBody>
+      </p:sp>
+      <p:grpSp>
+        <p:nvGrpSpPr>
+          <p:cNvPr id="19" name="Group 18">
+            <a:extLst>
+              <a:ext uri="{FF2B5EF4-FFF2-40B4-BE49-F238E27FC236}">
+                <a16:creationId xmlns:a16="http://schemas.microsoft.com/office/drawing/2014/main" id="{411C3111-7D85-460C-A9BA-6AB71EB43702}"/>
+              </a:ext>
+            </a:extLst>
+          </p:cNvPr>
+          <p:cNvGrpSpPr/>
+          <p:nvPr/>
+        </p:nvGrpSpPr>
+        <p:grpSpPr>
+          <a:xfrm>
+            <a:off x="2780227" y="3913204"/>
+            <a:ext cx="1819043" cy="2410026"/>
+            <a:chOff x="5716564" y="2199601"/>
+            <a:chExt cx="2132935" cy="2825897"/>
+          </a:xfrm>
+        </p:grpSpPr>
+        <p:sp>
+          <p:nvSpPr>
+            <p:cNvPr id="23" name="Rectangle 22">
+              <a:extLst>
+                <a:ext uri="{FF2B5EF4-FFF2-40B4-BE49-F238E27FC236}">
+                  <a16:creationId xmlns:a16="http://schemas.microsoft.com/office/drawing/2014/main" id="{CF84C033-6C07-4825-B411-31EE3E63838A}"/>
+                </a:ext>
+              </a:extLst>
+            </p:cNvPr>
+            <p:cNvSpPr/>
+            <p:nvPr/>
+          </p:nvSpPr>
+          <p:spPr>
+            <a:xfrm>
+              <a:off x="5906722" y="2436426"/>
+              <a:ext cx="1942777" cy="2589072"/>
+            </a:xfrm>
+            <a:prstGeom prst="rect">
+              <a:avLst/>
+            </a:prstGeom>
+            <a:solidFill>
+              <a:schemeClr val="bg1"/>
+            </a:solidFill>
+            <a:ln>
+              <a:solidFill>
+                <a:schemeClr val="tx1"/>
+              </a:solidFill>
+            </a:ln>
+          </p:spPr>
+          <p:style>
+            <a:lnRef idx="2">
+              <a:schemeClr val="accent1">
+                <a:shade val="50000"/>
+              </a:schemeClr>
+            </a:lnRef>
+            <a:fillRef idx="1">
+              <a:schemeClr val="accent1"/>
+            </a:fillRef>
+            <a:effectRef idx="0">
+              <a:schemeClr val="accent1"/>
+            </a:effectRef>
+            <a:fontRef idx="minor">
+              <a:schemeClr val="lt1"/>
+            </a:fontRef>
+          </p:style>
+          <p:txBody>
+            <a:bodyPr rtlCol="0" anchor="ctr"/>
+            <a:lstStyle/>
+            <a:p>
+              <a:pPr algn="ctr"/>
+              <a:endParaRPr lang="en-US"/>
+            </a:p>
+          </p:txBody>
+        </p:sp>
+        <p:sp>
+          <p:nvSpPr>
+            <p:cNvPr id="24" name="Rectangle 23">
+              <a:extLst>
+                <a:ext uri="{FF2B5EF4-FFF2-40B4-BE49-F238E27FC236}">
+                  <a16:creationId xmlns:a16="http://schemas.microsoft.com/office/drawing/2014/main" id="{256E3943-A99C-4A96-9E41-24287291CE78}"/>
+                </a:ext>
+              </a:extLst>
+            </p:cNvPr>
+            <p:cNvSpPr/>
+            <p:nvPr/>
+          </p:nvSpPr>
+          <p:spPr>
+            <a:xfrm>
+              <a:off x="5843336" y="2358731"/>
+              <a:ext cx="1942777" cy="2589072"/>
+            </a:xfrm>
+            <a:prstGeom prst="rect">
+              <a:avLst/>
+            </a:prstGeom>
+            <a:solidFill>
+              <a:schemeClr val="bg1"/>
+            </a:solidFill>
+            <a:ln>
+              <a:solidFill>
+                <a:schemeClr val="tx1"/>
+              </a:solidFill>
+            </a:ln>
+          </p:spPr>
+          <p:style>
+            <a:lnRef idx="2">
+              <a:schemeClr val="accent1">
+                <a:shade val="50000"/>
+              </a:schemeClr>
+            </a:lnRef>
+            <a:fillRef idx="1">
+              <a:schemeClr val="accent1"/>
+            </a:fillRef>
+            <a:effectRef idx="0">
+              <a:schemeClr val="accent1"/>
+            </a:effectRef>
+            <a:fontRef idx="minor">
+              <a:schemeClr val="lt1"/>
+            </a:fontRef>
+          </p:style>
+          <p:txBody>
+            <a:bodyPr rtlCol="0" anchor="ctr"/>
+            <a:lstStyle/>
+            <a:p>
+              <a:pPr algn="ctr"/>
+              <a:endParaRPr lang="en-US"/>
+            </a:p>
+          </p:txBody>
+        </p:sp>
+        <p:sp>
+          <p:nvSpPr>
+            <p:cNvPr id="25" name="Rectangle 24">
+              <a:extLst>
+                <a:ext uri="{FF2B5EF4-FFF2-40B4-BE49-F238E27FC236}">
+                  <a16:creationId xmlns:a16="http://schemas.microsoft.com/office/drawing/2014/main" id="{C47C1D3F-00FF-4658-A242-6AB9C4644CB0}"/>
+                </a:ext>
+              </a:extLst>
+            </p:cNvPr>
+            <p:cNvSpPr/>
+            <p:nvPr/>
+          </p:nvSpPr>
+          <p:spPr>
+            <a:xfrm>
+              <a:off x="5779950" y="2280890"/>
+              <a:ext cx="1942777" cy="2589072"/>
+            </a:xfrm>
+            <a:prstGeom prst="rect">
+              <a:avLst/>
+            </a:prstGeom>
+            <a:solidFill>
+              <a:schemeClr val="bg1"/>
+            </a:solidFill>
+            <a:ln>
+              <a:solidFill>
+                <a:schemeClr val="tx1"/>
+              </a:solidFill>
+            </a:ln>
+          </p:spPr>
+          <p:style>
+            <a:lnRef idx="2">
+              <a:schemeClr val="accent1">
+                <a:shade val="50000"/>
+              </a:schemeClr>
+            </a:lnRef>
+            <a:fillRef idx="1">
+              <a:schemeClr val="accent1"/>
+            </a:fillRef>
+            <a:effectRef idx="0">
+              <a:schemeClr val="accent1"/>
+            </a:effectRef>
+            <a:fontRef idx="minor">
+              <a:schemeClr val="lt1"/>
+            </a:fontRef>
+          </p:style>
+          <p:txBody>
+            <a:bodyPr rtlCol="0" anchor="ctr"/>
+            <a:lstStyle/>
+            <a:p>
+              <a:pPr algn="ctr"/>
+              <a:endParaRPr lang="en-US"/>
+            </a:p>
+          </p:txBody>
+        </p:sp>
+        <p:pic>
+          <p:nvPicPr>
+            <p:cNvPr id="27" name="Picture 26" descr="A picture containing table, indoor&#10;&#10;Description automatically generated">
+              <a:extLst>
+                <a:ext uri="{FF2B5EF4-FFF2-40B4-BE49-F238E27FC236}">
+                  <a16:creationId xmlns:a16="http://schemas.microsoft.com/office/drawing/2014/main" id="{4B3DE23C-FB9C-4D30-9F09-A9EC46508939}"/>
+                </a:ext>
+              </a:extLst>
+            </p:cNvPr>
+            <p:cNvPicPr>
+              <a:picLocks noChangeAspect="1"/>
+            </p:cNvPicPr>
+            <p:nvPr/>
+          </p:nvPicPr>
+          <p:blipFill>
+            <a:blip r:embed="rId4">
+              <a:extLst>
+                <a:ext uri="{28A0092B-C50C-407E-A947-70E740481C1C}">
+                  <a14:useLocalDpi xmlns:a14="http://schemas.microsoft.com/office/drawing/2010/main" val="0"/>
+                </a:ext>
+              </a:extLst>
+            </a:blip>
+            <a:stretch>
+              <a:fillRect/>
+            </a:stretch>
+          </p:blipFill>
+          <p:spPr>
+            <a:xfrm>
+              <a:off x="5716564" y="2199601"/>
+              <a:ext cx="1942777" cy="2594867"/>
+            </a:xfrm>
+            <a:prstGeom prst="rect">
+              <a:avLst/>
+            </a:prstGeom>
+          </p:spPr>
+        </p:pic>
+      </p:grpSp>
+      <p:sp>
+        <p:nvSpPr>
+          <p:cNvPr id="29" name="Rectangle 28">
+            <a:extLst>
+              <a:ext uri="{FF2B5EF4-FFF2-40B4-BE49-F238E27FC236}">
+                <a16:creationId xmlns:a16="http://schemas.microsoft.com/office/drawing/2014/main" id="{50536F1F-9AFD-4E9C-8E51-F4C9E0AFFDEF}"/>
+              </a:ext>
+            </a:extLst>
+          </p:cNvPr>
+          <p:cNvSpPr/>
+          <p:nvPr/>
+        </p:nvSpPr>
+        <p:spPr>
+          <a:xfrm>
+            <a:off x="2329398" y="6325381"/>
+            <a:ext cx="2877711" cy="369332"/>
+          </a:xfrm>
+          <a:prstGeom prst="rect">
+            <a:avLst/>
+          </a:prstGeom>
+        </p:spPr>
+        <p:txBody>
+          <a:bodyPr wrap="none">
+            <a:spAutoFit/>
+          </a:bodyPr>
+          <a:lstStyle/>
+          <a:p>
+            <a:r>
+              <a:rPr lang="en-US" altLang="en-US" dirty="0">
+                <a:latin typeface="Arial" panose="020B0604020202020204" pitchFamily="34" charset="0"/>
+                <a:ea typeface="-apple-system"/>
+              </a:rPr>
+              <a:t>Negative candidates set </a:t>
+            </a:r>
+            <a:r>
+              <a:rPr lang="en-US" altLang="en-US" i="1" dirty="0">
+                <a:latin typeface="Arial" panose="020B0604020202020204" pitchFamily="34" charset="0"/>
+                <a:ea typeface="-apple-system"/>
+              </a:rPr>
+              <a:t>U</a:t>
+            </a:r>
+            <a:endParaRPr lang="en-US" i="1" dirty="0"/>
+          </a:p>
+        </p:txBody>
+      </p:sp>
+      <p:cxnSp>
+        <p:nvCxnSpPr>
+          <p:cNvPr id="30" name="Straight Arrow Connector 29">
+            <a:extLst>
+              <a:ext uri="{FF2B5EF4-FFF2-40B4-BE49-F238E27FC236}">
+                <a16:creationId xmlns:a16="http://schemas.microsoft.com/office/drawing/2014/main" id="{0B53A6CF-4B97-41C5-BDDF-2D2DD2BFAA88}"/>
+              </a:ext>
+            </a:extLst>
+          </p:cNvPr>
+          <p:cNvCxnSpPr>
+            <a:cxnSpLocks/>
+          </p:cNvCxnSpPr>
+          <p:nvPr/>
+        </p:nvCxnSpPr>
+        <p:spPr>
+          <a:xfrm>
+            <a:off x="2788921" y="1588323"/>
+            <a:ext cx="2378627" cy="0"/>
+          </a:xfrm>
+          <a:prstGeom prst="straightConnector1">
+            <a:avLst/>
+          </a:prstGeom>
+          <a:ln w="25400">
+            <a:solidFill>
+              <a:schemeClr val="accent1"/>
+            </a:solidFill>
+            <a:tailEnd type="triangle" w="lg" len="med"/>
+          </a:ln>
+        </p:spPr>
+        <p:style>
+          <a:lnRef idx="1">
+            <a:schemeClr val="accent1"/>
+          </a:lnRef>
+          <a:fillRef idx="0">
+            <a:schemeClr val="accent1"/>
+          </a:fillRef>
+          <a:effectRef idx="0">
+            <a:schemeClr val="accent1"/>
+          </a:effectRef>
+          <a:fontRef idx="minor">
+            <a:schemeClr val="tx1"/>
+          </a:fontRef>
+        </p:style>
+      </p:cxnSp>
+      <p:sp>
+        <p:nvSpPr>
+          <p:cNvPr id="33" name="Rectangle 32">
+            <a:extLst>
+              <a:ext uri="{FF2B5EF4-FFF2-40B4-BE49-F238E27FC236}">
+                <a16:creationId xmlns:a16="http://schemas.microsoft.com/office/drawing/2014/main" id="{DB8948EF-049F-4BC8-9762-44B24986CB4D}"/>
+              </a:ext>
+            </a:extLst>
+          </p:cNvPr>
+          <p:cNvSpPr/>
+          <p:nvPr/>
+        </p:nvSpPr>
+        <p:spPr>
+          <a:xfrm>
+            <a:off x="3632966" y="1140145"/>
+            <a:ext cx="1261949" cy="369332"/>
+          </a:xfrm>
+          <a:prstGeom prst="rect">
+            <a:avLst/>
+          </a:prstGeom>
+        </p:spPr>
+        <p:txBody>
+          <a:bodyPr wrap="none">
+            <a:spAutoFit/>
+          </a:bodyPr>
+          <a:lstStyle/>
+          <a:p>
+            <a:pPr algn="ctr"/>
+            <a:r>
+              <a:rPr lang="en-US" altLang="en-US" dirty="0">
+                <a:solidFill>
+                  <a:schemeClr val="accent1"/>
+                </a:solidFill>
+                <a:latin typeface="Arial" panose="020B0604020202020204" pitchFamily="34" charset="0"/>
+                <a:ea typeface="-apple-system"/>
+              </a:rPr>
+              <a:t>1. Training</a:t>
+            </a:r>
+            <a:endParaRPr lang="en-US" dirty="0">
+              <a:solidFill>
+                <a:schemeClr val="accent1"/>
+              </a:solidFill>
+            </a:endParaRPr>
+          </a:p>
+        </p:txBody>
+      </p:sp>
+      <p:cxnSp>
+        <p:nvCxnSpPr>
+          <p:cNvPr id="34" name="Straight Arrow Connector 33">
+            <a:extLst>
+              <a:ext uri="{FF2B5EF4-FFF2-40B4-BE49-F238E27FC236}">
+                <a16:creationId xmlns:a16="http://schemas.microsoft.com/office/drawing/2014/main" id="{8F15D27D-B27B-49F9-AF9F-8636D1EFCC8C}"/>
+              </a:ext>
+            </a:extLst>
+          </p:cNvPr>
+          <p:cNvCxnSpPr>
+            <a:cxnSpLocks/>
+          </p:cNvCxnSpPr>
+          <p:nvPr/>
+        </p:nvCxnSpPr>
+        <p:spPr>
+          <a:xfrm rot="5400000" flipH="1" flipV="1">
+            <a:off x="3397583" y="2058336"/>
+            <a:ext cx="1725175" cy="1814755"/>
+          </a:xfrm>
+          <a:prstGeom prst="bentConnector2">
+            <a:avLst/>
+          </a:prstGeom>
+          <a:ln w="25400">
+            <a:solidFill>
+              <a:schemeClr val="accent1"/>
+            </a:solidFill>
+            <a:tailEnd type="triangle" w="lg" len="med"/>
+          </a:ln>
+        </p:spPr>
+        <p:style>
+          <a:lnRef idx="1">
+            <a:schemeClr val="accent1"/>
+          </a:lnRef>
+          <a:fillRef idx="0">
+            <a:schemeClr val="accent1"/>
+          </a:fillRef>
+          <a:effectRef idx="0">
+            <a:schemeClr val="accent1"/>
+          </a:effectRef>
+          <a:fontRef idx="minor">
+            <a:schemeClr val="tx1"/>
+          </a:fontRef>
+        </p:style>
+      </p:cxnSp>
+      <p:sp>
+        <p:nvSpPr>
+          <p:cNvPr id="41" name="Rectangle 40">
+            <a:extLst>
+              <a:ext uri="{FF2B5EF4-FFF2-40B4-BE49-F238E27FC236}">
+                <a16:creationId xmlns:a16="http://schemas.microsoft.com/office/drawing/2014/main" id="{BF135BFC-242F-46AA-A7AA-76B1F9C8EA38}"/>
+              </a:ext>
+            </a:extLst>
+          </p:cNvPr>
+          <p:cNvSpPr/>
+          <p:nvPr/>
+        </p:nvSpPr>
+        <p:spPr>
+          <a:xfrm>
+            <a:off x="3459408" y="2193965"/>
+            <a:ext cx="1628663" cy="646331"/>
+          </a:xfrm>
+          <a:prstGeom prst="rect">
+            <a:avLst/>
+          </a:prstGeom>
+        </p:spPr>
+        <p:txBody>
+          <a:bodyPr wrap="square">
+            <a:spAutoFit/>
+          </a:bodyPr>
+          <a:lstStyle/>
+          <a:p>
+            <a:pPr algn="ctr"/>
+            <a:r>
+              <a:rPr lang="en-US" altLang="en-US" dirty="0">
+                <a:solidFill>
+                  <a:schemeClr val="accent1"/>
+                </a:solidFill>
+                <a:latin typeface="Arial" panose="020B0604020202020204" pitchFamily="34" charset="0"/>
+                <a:ea typeface="-apple-system"/>
+              </a:rPr>
+              <a:t>2. Prediction</a:t>
+            </a:r>
+            <a:br>
+              <a:rPr lang="en-US" altLang="en-US" dirty="0">
+                <a:solidFill>
+                  <a:schemeClr val="accent1"/>
+                </a:solidFill>
+                <a:latin typeface="Arial" panose="020B0604020202020204" pitchFamily="34" charset="0"/>
+                <a:ea typeface="-apple-system"/>
+              </a:rPr>
+            </a:br>
+            <a:endParaRPr lang="en-US" dirty="0">
+              <a:solidFill>
+                <a:schemeClr val="accent1"/>
+              </a:solidFill>
+            </a:endParaRPr>
+          </a:p>
+        </p:txBody>
+      </p:sp>
+      <p:cxnSp>
+        <p:nvCxnSpPr>
+          <p:cNvPr id="44" name="Straight Arrow Connector 43">
+            <a:extLst>
+              <a:ext uri="{FF2B5EF4-FFF2-40B4-BE49-F238E27FC236}">
+                <a16:creationId xmlns:a16="http://schemas.microsoft.com/office/drawing/2014/main" id="{F026E089-E78E-4E55-9AFF-AD0AD647EE74}"/>
+              </a:ext>
+            </a:extLst>
+          </p:cNvPr>
+          <p:cNvCxnSpPr>
+            <a:cxnSpLocks/>
+          </p:cNvCxnSpPr>
+          <p:nvPr/>
+        </p:nvCxnSpPr>
+        <p:spPr>
+          <a:xfrm>
+            <a:off x="7348228" y="2188029"/>
+            <a:ext cx="1467068" cy="0"/>
+          </a:xfrm>
+          <a:prstGeom prst="straightConnector1">
+            <a:avLst/>
+          </a:prstGeom>
+          <a:ln w="25400">
+            <a:solidFill>
+              <a:schemeClr val="accent1"/>
+            </a:solidFill>
+            <a:tailEnd type="triangle" w="lg" len="med"/>
+          </a:ln>
+        </p:spPr>
+        <p:style>
+          <a:lnRef idx="1">
+            <a:schemeClr val="accent1"/>
+          </a:lnRef>
+          <a:fillRef idx="0">
+            <a:schemeClr val="accent1"/>
+          </a:fillRef>
+          <a:effectRef idx="0">
+            <a:schemeClr val="accent1"/>
+          </a:effectRef>
+          <a:fontRef idx="minor">
+            <a:schemeClr val="tx1"/>
+          </a:fontRef>
+        </p:style>
+      </p:cxnSp>
+      <p:sp>
+        <p:nvSpPr>
+          <p:cNvPr id="47" name="Rectangle 46">
+            <a:extLst>
+              <a:ext uri="{FF2B5EF4-FFF2-40B4-BE49-F238E27FC236}">
+                <a16:creationId xmlns:a16="http://schemas.microsoft.com/office/drawing/2014/main" id="{69FEC8A5-562A-4450-A3C1-BCD76BDBE2A9}"/>
+              </a:ext>
+            </a:extLst>
+          </p:cNvPr>
+          <p:cNvSpPr/>
+          <p:nvPr/>
+        </p:nvSpPr>
+        <p:spPr>
+          <a:xfrm>
+            <a:off x="7348228" y="2350425"/>
+            <a:ext cx="1467068" cy="646331"/>
+          </a:xfrm>
+          <a:prstGeom prst="rect">
+            <a:avLst/>
+          </a:prstGeom>
+        </p:spPr>
+        <p:txBody>
+          <a:bodyPr wrap="none">
+            <a:spAutoFit/>
+          </a:bodyPr>
+          <a:lstStyle/>
+          <a:p>
+            <a:pPr algn="ctr"/>
+            <a:r>
+              <a:rPr lang="en-US" altLang="en-US" dirty="0">
+                <a:solidFill>
+                  <a:schemeClr val="accent1"/>
+                </a:solidFill>
+                <a:latin typeface="Arial" panose="020B0604020202020204" pitchFamily="34" charset="0"/>
+                <a:ea typeface="-apple-system"/>
+              </a:rPr>
+              <a:t>2. Prediction</a:t>
+            </a:r>
+            <a:br>
+              <a:rPr lang="en-US" altLang="en-US" dirty="0">
+                <a:solidFill>
+                  <a:schemeClr val="accent1"/>
+                </a:solidFill>
+                <a:latin typeface="Arial" panose="020B0604020202020204" pitchFamily="34" charset="0"/>
+                <a:ea typeface="-apple-system"/>
+              </a:rPr>
+            </a:br>
+            <a:r>
+              <a:rPr lang="en-US" altLang="en-US" dirty="0">
+                <a:solidFill>
+                  <a:schemeClr val="accent1"/>
+                </a:solidFill>
+                <a:latin typeface="Arial" panose="020B0604020202020204" pitchFamily="34" charset="0"/>
+                <a:ea typeface="-apple-system"/>
+              </a:rPr>
+              <a:t>(score)</a:t>
+            </a:r>
+            <a:endParaRPr lang="en-US" dirty="0">
+              <a:solidFill>
+                <a:schemeClr val="accent1"/>
+              </a:solidFill>
+            </a:endParaRPr>
+          </a:p>
+        </p:txBody>
+      </p:sp>
+      <p:sp>
+        <p:nvSpPr>
+          <p:cNvPr id="48" name="Rectangle 47">
+            <a:extLst>
+              <a:ext uri="{FF2B5EF4-FFF2-40B4-BE49-F238E27FC236}">
+                <a16:creationId xmlns:a16="http://schemas.microsoft.com/office/drawing/2014/main" id="{3442D06D-FA1A-4BAD-928C-D8913E2E2873}"/>
+              </a:ext>
+            </a:extLst>
+          </p:cNvPr>
+          <p:cNvSpPr/>
+          <p:nvPr/>
+        </p:nvSpPr>
+        <p:spPr>
+          <a:xfrm>
+            <a:off x="8815296" y="1879838"/>
+            <a:ext cx="2537874" cy="646331"/>
+          </a:xfrm>
+          <a:prstGeom prst="rect">
+            <a:avLst/>
+          </a:prstGeom>
+        </p:spPr>
+        <p:txBody>
+          <a:bodyPr wrap="none">
+            <a:spAutoFit/>
+          </a:bodyPr>
+          <a:lstStyle/>
+          <a:p>
+            <a:r>
+              <a:rPr lang="en-US" altLang="en-US" b="1" dirty="0">
+                <a:latin typeface="Arial" panose="020B0604020202020204" pitchFamily="34" charset="0"/>
+                <a:ea typeface="-apple-system"/>
+              </a:rPr>
+              <a:t>Label = ‘water_bottle’</a:t>
+            </a:r>
+          </a:p>
+          <a:p>
+            <a:r>
+              <a:rPr lang="en-US" altLang="en-US" b="1" dirty="0">
+                <a:latin typeface="Arial" panose="020B0604020202020204" pitchFamily="34" charset="0"/>
+                <a:ea typeface="-apple-system"/>
+              </a:rPr>
+              <a:t>Score = 0.732</a:t>
+            </a:r>
+            <a:endParaRPr lang="en-US" b="1" dirty="0"/>
+          </a:p>
+        </p:txBody>
+      </p:sp>
+      <p:cxnSp>
+        <p:nvCxnSpPr>
+          <p:cNvPr id="49" name="Straight Arrow Connector 33">
+            <a:extLst>
+              <a:ext uri="{FF2B5EF4-FFF2-40B4-BE49-F238E27FC236}">
+                <a16:creationId xmlns:a16="http://schemas.microsoft.com/office/drawing/2014/main" id="{36DFFDAC-C0AF-4E75-A6CC-5B50A2512BCF}"/>
+              </a:ext>
+            </a:extLst>
+          </p:cNvPr>
+          <p:cNvCxnSpPr>
+            <a:cxnSpLocks/>
+            <a:stCxn id="48" idx="2"/>
+          </p:cNvCxnSpPr>
+          <p:nvPr/>
+        </p:nvCxnSpPr>
+        <p:spPr>
+          <a:xfrm rot="5400000">
+            <a:off x="6370889" y="883625"/>
+            <a:ext cx="2070801" cy="5355889"/>
+          </a:xfrm>
+          <a:prstGeom prst="bentConnector2">
+            <a:avLst/>
+          </a:prstGeom>
+          <a:ln w="25400">
+            <a:solidFill>
+              <a:schemeClr val="accent1"/>
+            </a:solidFill>
+            <a:tailEnd type="triangle" w="lg" len="med"/>
+          </a:ln>
+        </p:spPr>
+        <p:style>
+          <a:lnRef idx="1">
+            <a:schemeClr val="accent1"/>
+          </a:lnRef>
+          <a:fillRef idx="0">
+            <a:schemeClr val="accent1"/>
+          </a:fillRef>
+          <a:effectRef idx="0">
+            <a:schemeClr val="accent1"/>
+          </a:effectRef>
+          <a:fontRef idx="minor">
+            <a:schemeClr val="tx1"/>
+          </a:fontRef>
+        </p:style>
+      </p:cxnSp>
+      <p:sp>
+        <p:nvSpPr>
+          <p:cNvPr id="52" name="Rectangle 51">
+            <a:extLst>
+              <a:ext uri="{FF2B5EF4-FFF2-40B4-BE49-F238E27FC236}">
+                <a16:creationId xmlns:a16="http://schemas.microsoft.com/office/drawing/2014/main" id="{1F8F620F-578D-43CE-95EC-A7E2F78F702E}"/>
+              </a:ext>
+            </a:extLst>
+          </p:cNvPr>
+          <p:cNvSpPr/>
+          <p:nvPr/>
+        </p:nvSpPr>
+        <p:spPr>
+          <a:xfrm>
+            <a:off x="5969456" y="4696081"/>
+            <a:ext cx="2095445" cy="646331"/>
+          </a:xfrm>
+          <a:prstGeom prst="rect">
+            <a:avLst/>
+          </a:prstGeom>
+        </p:spPr>
+        <p:txBody>
+          <a:bodyPr wrap="none">
+            <a:spAutoFit/>
+          </a:bodyPr>
+          <a:lstStyle/>
+          <a:p>
+            <a:pPr algn="ctr"/>
+            <a:r>
+              <a:rPr lang="en-US" altLang="en-US" dirty="0">
+                <a:solidFill>
+                  <a:schemeClr val="accent1"/>
+                </a:solidFill>
+                <a:latin typeface="Arial" panose="020B0604020202020204" pitchFamily="34" charset="0"/>
+                <a:ea typeface="-apple-system"/>
+              </a:rPr>
+              <a:t>3. Negative mining</a:t>
+            </a:r>
+            <a:br>
+              <a:rPr lang="en-US" altLang="en-US" dirty="0">
+                <a:solidFill>
+                  <a:schemeClr val="accent1"/>
+                </a:solidFill>
+                <a:latin typeface="Arial" panose="020B0604020202020204" pitchFamily="34" charset="0"/>
+                <a:ea typeface="-apple-system"/>
+              </a:rPr>
+            </a:br>
+            <a:r>
+              <a:rPr lang="en-US" altLang="en-US" dirty="0">
+                <a:solidFill>
+                  <a:schemeClr val="accent1"/>
+                </a:solidFill>
+                <a:latin typeface="Arial" panose="020B0604020202020204" pitchFamily="34" charset="0"/>
+                <a:ea typeface="-apple-system"/>
+              </a:rPr>
+              <a:t>(annotation)</a:t>
+            </a:r>
+            <a:endParaRPr lang="en-US" dirty="0">
+              <a:solidFill>
+                <a:schemeClr val="accent1"/>
+              </a:solidFill>
+            </a:endParaRPr>
+          </a:p>
+        </p:txBody>
+      </p:sp>
+      <p:cxnSp>
+        <p:nvCxnSpPr>
+          <p:cNvPr id="54" name="Straight Arrow Connector 33">
+            <a:extLst>
+              <a:ext uri="{FF2B5EF4-FFF2-40B4-BE49-F238E27FC236}">
+                <a16:creationId xmlns:a16="http://schemas.microsoft.com/office/drawing/2014/main" id="{500A8E5D-EB02-4032-AC09-C91B8761858C}"/>
+              </a:ext>
+            </a:extLst>
+          </p:cNvPr>
+          <p:cNvCxnSpPr>
+            <a:cxnSpLocks/>
+          </p:cNvCxnSpPr>
+          <p:nvPr/>
+        </p:nvCxnSpPr>
+        <p:spPr>
+          <a:xfrm rot="16200000" flipV="1">
+            <a:off x="1729104" y="3591130"/>
+            <a:ext cx="1015695" cy="863211"/>
+          </a:xfrm>
+          <a:prstGeom prst="bentConnector3">
+            <a:avLst>
+              <a:gd name="adj1" fmla="val -1444"/>
+            </a:avLst>
+          </a:prstGeom>
+          <a:ln w="25400">
+            <a:solidFill>
+              <a:schemeClr val="accent1"/>
+            </a:solidFill>
+            <a:tailEnd type="triangle" w="lg" len="med"/>
+          </a:ln>
+        </p:spPr>
+        <p:style>
+          <a:lnRef idx="1">
+            <a:schemeClr val="accent1"/>
+          </a:lnRef>
+          <a:fillRef idx="0">
+            <a:schemeClr val="accent1"/>
+          </a:fillRef>
+          <a:effectRef idx="0">
+            <a:schemeClr val="accent1"/>
+          </a:effectRef>
+          <a:fontRef idx="minor">
+            <a:schemeClr val="tx1"/>
+          </a:fontRef>
+        </p:style>
+      </p:cxnSp>
+      <p:sp>
+        <p:nvSpPr>
+          <p:cNvPr id="58" name="Rectangle 57">
+            <a:extLst>
+              <a:ext uri="{FF2B5EF4-FFF2-40B4-BE49-F238E27FC236}">
+                <a16:creationId xmlns:a16="http://schemas.microsoft.com/office/drawing/2014/main" id="{E79C830A-FE7F-4889-A32E-938775F879DB}"/>
+              </a:ext>
+            </a:extLst>
+          </p:cNvPr>
+          <p:cNvSpPr/>
+          <p:nvPr/>
+        </p:nvSpPr>
+        <p:spPr>
+          <a:xfrm>
+            <a:off x="504182" y="4634574"/>
+            <a:ext cx="2095445" cy="646331"/>
+          </a:xfrm>
+          <a:prstGeom prst="rect">
+            <a:avLst/>
+          </a:prstGeom>
+        </p:spPr>
+        <p:txBody>
+          <a:bodyPr wrap="none">
+            <a:spAutoFit/>
+          </a:bodyPr>
+          <a:lstStyle/>
+          <a:p>
+            <a:pPr algn="ctr"/>
+            <a:r>
+              <a:rPr lang="en-US" altLang="en-US" dirty="0">
+                <a:solidFill>
+                  <a:schemeClr val="accent1"/>
+                </a:solidFill>
+                <a:latin typeface="Arial" panose="020B0604020202020204" pitchFamily="34" charset="0"/>
+                <a:ea typeface="-apple-system"/>
+              </a:rPr>
+              <a:t>3. Negative mining</a:t>
+            </a:r>
+            <a:br>
+              <a:rPr lang="en-US" altLang="en-US" dirty="0">
+                <a:solidFill>
+                  <a:schemeClr val="accent1"/>
+                </a:solidFill>
+                <a:latin typeface="Arial" panose="020B0604020202020204" pitchFamily="34" charset="0"/>
+                <a:ea typeface="-apple-system"/>
+              </a:rPr>
+            </a:br>
+            <a:r>
+              <a:rPr lang="en-US" altLang="en-US" dirty="0">
+                <a:solidFill>
+                  <a:schemeClr val="accent1"/>
+                </a:solidFill>
+                <a:latin typeface="Arial" panose="020B0604020202020204" pitchFamily="34" charset="0"/>
+                <a:ea typeface="-apple-system"/>
+              </a:rPr>
+              <a:t>(add to </a:t>
+            </a:r>
+            <a:r>
+              <a:rPr lang="en-US" altLang="en-US" i="1" dirty="0">
+                <a:solidFill>
+                  <a:schemeClr val="accent1"/>
+                </a:solidFill>
+                <a:latin typeface="Arial" panose="020B0604020202020204" pitchFamily="34" charset="0"/>
+                <a:ea typeface="-apple-system"/>
+              </a:rPr>
+              <a:t>T</a:t>
+            </a:r>
+            <a:r>
+              <a:rPr lang="en-US" altLang="en-US" dirty="0">
+                <a:solidFill>
+                  <a:schemeClr val="accent1"/>
+                </a:solidFill>
+                <a:latin typeface="Arial" panose="020B0604020202020204" pitchFamily="34" charset="0"/>
+                <a:ea typeface="-apple-system"/>
+              </a:rPr>
+              <a:t>)</a:t>
+            </a:r>
+            <a:endParaRPr lang="en-US" dirty="0">
+              <a:solidFill>
+                <a:schemeClr val="accent1"/>
+              </a:solidFill>
+            </a:endParaRPr>
+          </a:p>
+        </p:txBody>
+      </p:sp>
+      <p:grpSp>
+        <p:nvGrpSpPr>
+          <p:cNvPr id="31" name="Group 30">
+            <a:extLst>
+              <a:ext uri="{FF2B5EF4-FFF2-40B4-BE49-F238E27FC236}">
+                <a16:creationId xmlns:a16="http://schemas.microsoft.com/office/drawing/2014/main" id="{7C349547-55A0-49DF-AC4A-1F0FBC266AFA}"/>
+              </a:ext>
+            </a:extLst>
+          </p:cNvPr>
+          <p:cNvGrpSpPr/>
+          <p:nvPr/>
+        </p:nvGrpSpPr>
+        <p:grpSpPr>
+          <a:xfrm>
+            <a:off x="9426613" y="300355"/>
+            <a:ext cx="1226665" cy="1625192"/>
+            <a:chOff x="5716564" y="2199601"/>
+            <a:chExt cx="2132935" cy="2825897"/>
+          </a:xfrm>
+        </p:grpSpPr>
+        <p:sp>
+          <p:nvSpPr>
+            <p:cNvPr id="32" name="Rectangle 31">
+              <a:extLst>
+                <a:ext uri="{FF2B5EF4-FFF2-40B4-BE49-F238E27FC236}">
+                  <a16:creationId xmlns:a16="http://schemas.microsoft.com/office/drawing/2014/main" id="{E529C897-C237-4BE2-B633-C8AF7141DF02}"/>
+                </a:ext>
+              </a:extLst>
+            </p:cNvPr>
+            <p:cNvSpPr/>
+            <p:nvPr/>
+          </p:nvSpPr>
+          <p:spPr>
+            <a:xfrm>
+              <a:off x="5906722" y="2436426"/>
+              <a:ext cx="1942777" cy="2589072"/>
+            </a:xfrm>
+            <a:prstGeom prst="rect">
+              <a:avLst/>
+            </a:prstGeom>
+            <a:solidFill>
+              <a:schemeClr val="bg1"/>
+            </a:solidFill>
+            <a:ln>
+              <a:solidFill>
+                <a:schemeClr val="tx1"/>
+              </a:solidFill>
+            </a:ln>
+          </p:spPr>
+          <p:style>
+            <a:lnRef idx="2">
+              <a:schemeClr val="accent1">
+                <a:shade val="50000"/>
+              </a:schemeClr>
+            </a:lnRef>
+            <a:fillRef idx="1">
+              <a:schemeClr val="accent1"/>
+            </a:fillRef>
+            <a:effectRef idx="0">
+              <a:schemeClr val="accent1"/>
+            </a:effectRef>
+            <a:fontRef idx="minor">
+              <a:schemeClr val="lt1"/>
+            </a:fontRef>
+          </p:style>
+          <p:txBody>
+            <a:bodyPr rtlCol="0" anchor="ctr"/>
+            <a:lstStyle/>
+            <a:p>
+              <a:pPr algn="ctr"/>
+              <a:endParaRPr lang="en-US"/>
+            </a:p>
+          </p:txBody>
+        </p:sp>
+        <p:sp>
+          <p:nvSpPr>
+            <p:cNvPr id="35" name="Rectangle 34">
+              <a:extLst>
+                <a:ext uri="{FF2B5EF4-FFF2-40B4-BE49-F238E27FC236}">
+                  <a16:creationId xmlns:a16="http://schemas.microsoft.com/office/drawing/2014/main" id="{FD710308-8D46-4B06-B729-8F7B13D092CF}"/>
+                </a:ext>
+              </a:extLst>
+            </p:cNvPr>
+            <p:cNvSpPr/>
+            <p:nvPr/>
+          </p:nvSpPr>
+          <p:spPr>
+            <a:xfrm>
+              <a:off x="5843336" y="2358731"/>
+              <a:ext cx="1942777" cy="2589072"/>
+            </a:xfrm>
+            <a:prstGeom prst="rect">
+              <a:avLst/>
+            </a:prstGeom>
+            <a:solidFill>
+              <a:schemeClr val="bg1"/>
+            </a:solidFill>
+            <a:ln>
+              <a:solidFill>
+                <a:schemeClr val="tx1"/>
+              </a:solidFill>
+            </a:ln>
+          </p:spPr>
+          <p:style>
+            <a:lnRef idx="2">
+              <a:schemeClr val="accent1">
+                <a:shade val="50000"/>
+              </a:schemeClr>
+            </a:lnRef>
+            <a:fillRef idx="1">
+              <a:schemeClr val="accent1"/>
+            </a:fillRef>
+            <a:effectRef idx="0">
+              <a:schemeClr val="accent1"/>
+            </a:effectRef>
+            <a:fontRef idx="minor">
+              <a:schemeClr val="lt1"/>
+            </a:fontRef>
+          </p:style>
+          <p:txBody>
+            <a:bodyPr rtlCol="0" anchor="ctr"/>
+            <a:lstStyle/>
+            <a:p>
+              <a:pPr algn="ctr"/>
+              <a:endParaRPr lang="en-US"/>
+            </a:p>
+          </p:txBody>
+        </p:sp>
+        <p:sp>
+          <p:nvSpPr>
+            <p:cNvPr id="36" name="Rectangle 35">
+              <a:extLst>
+                <a:ext uri="{FF2B5EF4-FFF2-40B4-BE49-F238E27FC236}">
+                  <a16:creationId xmlns:a16="http://schemas.microsoft.com/office/drawing/2014/main" id="{FA3BD366-FE2B-44B9-83F7-3608C6BBF854}"/>
+                </a:ext>
+              </a:extLst>
+            </p:cNvPr>
+            <p:cNvSpPr/>
+            <p:nvPr/>
+          </p:nvSpPr>
+          <p:spPr>
+            <a:xfrm>
+              <a:off x="5779950" y="2280890"/>
+              <a:ext cx="1942777" cy="2589072"/>
+            </a:xfrm>
+            <a:prstGeom prst="rect">
+              <a:avLst/>
+            </a:prstGeom>
+            <a:solidFill>
+              <a:schemeClr val="bg1"/>
+            </a:solidFill>
+            <a:ln>
+              <a:solidFill>
+                <a:schemeClr val="tx1"/>
+              </a:solidFill>
+            </a:ln>
+          </p:spPr>
+          <p:style>
+            <a:lnRef idx="2">
+              <a:schemeClr val="accent1">
+                <a:shade val="50000"/>
+              </a:schemeClr>
+            </a:lnRef>
+            <a:fillRef idx="1">
+              <a:schemeClr val="accent1"/>
+            </a:fillRef>
+            <a:effectRef idx="0">
+              <a:schemeClr val="accent1"/>
+            </a:effectRef>
+            <a:fontRef idx="minor">
+              <a:schemeClr val="lt1"/>
+            </a:fontRef>
+          </p:style>
+          <p:txBody>
+            <a:bodyPr rtlCol="0" anchor="ctr"/>
+            <a:lstStyle/>
+            <a:p>
+              <a:pPr algn="ctr"/>
+              <a:endParaRPr lang="en-US"/>
+            </a:p>
+          </p:txBody>
+        </p:sp>
+        <p:pic>
+          <p:nvPicPr>
+            <p:cNvPr id="37" name="Picture 36" descr="A picture containing table, indoor&#10;&#10;Description automatically generated">
+              <a:extLst>
+                <a:ext uri="{FF2B5EF4-FFF2-40B4-BE49-F238E27FC236}">
+                  <a16:creationId xmlns:a16="http://schemas.microsoft.com/office/drawing/2014/main" id="{8287DE3B-2038-4744-8390-012C3AD00293}"/>
+                </a:ext>
+              </a:extLst>
+            </p:cNvPr>
+            <p:cNvPicPr>
+              <a:picLocks noChangeAspect="1"/>
+            </p:cNvPicPr>
+            <p:nvPr/>
+          </p:nvPicPr>
+          <p:blipFill>
+            <a:blip r:embed="rId4">
+              <a:extLst>
+                <a:ext uri="{28A0092B-C50C-407E-A947-70E740481C1C}">
+                  <a14:useLocalDpi xmlns:a14="http://schemas.microsoft.com/office/drawing/2010/main" val="0"/>
+                </a:ext>
+              </a:extLst>
+            </a:blip>
+            <a:stretch>
+              <a:fillRect/>
+            </a:stretch>
+          </p:blipFill>
+          <p:spPr>
+            <a:xfrm>
+              <a:off x="5716564" y="2199601"/>
+              <a:ext cx="1942777" cy="2594867"/>
+            </a:xfrm>
+            <a:prstGeom prst="rect">
+              <a:avLst/>
+            </a:prstGeom>
+          </p:spPr>
+        </p:pic>
+      </p:grpSp>
+      <p:sp>
+        <p:nvSpPr>
+          <p:cNvPr id="2" name="Rectangle 1">
+            <a:extLst>
+              <a:ext uri="{FF2B5EF4-FFF2-40B4-BE49-F238E27FC236}">
+                <a16:creationId xmlns:a16="http://schemas.microsoft.com/office/drawing/2014/main" id="{FA3663FF-E094-4A17-8699-B21B96DBD803}"/>
+              </a:ext>
+            </a:extLst>
+          </p:cNvPr>
+          <p:cNvSpPr/>
+          <p:nvPr/>
+        </p:nvSpPr>
+        <p:spPr>
+          <a:xfrm>
+            <a:off x="9703396" y="611730"/>
+            <a:ext cx="532504" cy="824416"/>
+          </a:xfrm>
+          <a:prstGeom prst="rect">
+            <a:avLst/>
+          </a:prstGeom>
+          <a:noFill/>
+          <a:ln w="38100">
+            <a:solidFill>
+              <a:srgbClr val="FFC000"/>
+            </a:solidFill>
+          </a:ln>
+        </p:spPr>
+        <p:style>
+          <a:lnRef idx="2">
+            <a:schemeClr val="accent1">
+              <a:shade val="50000"/>
+            </a:schemeClr>
+          </a:lnRef>
+          <a:fillRef idx="1">
+            <a:schemeClr val="accent1"/>
+          </a:fillRef>
+          <a:effectRef idx="0">
+            <a:schemeClr val="accent1"/>
+          </a:effectRef>
+          <a:fontRef idx="minor">
+            <a:schemeClr val="lt1"/>
+          </a:fontRef>
+        </p:style>
+        <p:txBody>
+          <a:bodyPr rtlCol="0" anchor="ctr"/>
+          <a:lstStyle/>
+          <a:p>
+            <a:pPr algn="ctr"/>
+            <a:endParaRPr lang="en-US"/>
+          </a:p>
+        </p:txBody>
+      </p:sp>
+    </p:spTree>
+    <p:extLst>
+      <p:ext uri="{BB962C8B-B14F-4D97-AF65-F5344CB8AC3E}">
+        <p14:creationId xmlns:p14="http://schemas.microsoft.com/office/powerpoint/2010/main" val="2336374100"/>
+      </p:ext>
+    </p:extLst>
+  </p:cSld>
+  <p:clrMapOvr>
+    <a:masterClrMapping/>
+  </p:clrMapOvr>
+</p:sld>
+</file>
+
+<file path=ppt/slides/slide4.xml><?xml version="1.0" encoding="utf-8"?>
+<p:sld xmlns:a="http://schemas.openxmlformats.org/drawingml/2006/main" xmlns:r="http://schemas.openxmlformats.org/officeDocument/2006/relationships" xmlns:p="http://schemas.openxmlformats.org/presentationml/2006/main">
+  <p:cSld>
+    <p:spTree>
+      <p:nvGrpSpPr>
+        <p:cNvPr id="1" name=""/>
+        <p:cNvGrpSpPr/>
+        <p:nvPr/>
+      </p:nvGrpSpPr>
+      <p:grpSpPr>
+        <a:xfrm>
+          <a:off x="0" y="0"/>
+          <a:ext cx="0" cy="0"/>
+          <a:chOff x="0" y="0"/>
+          <a:chExt cx="0" cy="0"/>
+        </a:xfrm>
+      </p:grpSpPr>
+      <p:sp>
+        <p:nvSpPr>
+          <p:cNvPr id="13" name="Rectangle 12">
+            <a:extLst>
+              <a:ext uri="{FF2B5EF4-FFF2-40B4-BE49-F238E27FC236}">
+                <a16:creationId xmlns:a16="http://schemas.microsoft.com/office/drawing/2014/main" id="{EF8496B6-3831-4053-8C66-8805C4332877}"/>
+              </a:ext>
+            </a:extLst>
+          </p:cNvPr>
+          <p:cNvSpPr/>
+          <p:nvPr/>
+        </p:nvSpPr>
+        <p:spPr>
+          <a:xfrm>
+            <a:off x="861883" y="6063168"/>
+            <a:ext cx="1582549" cy="369332"/>
+          </a:xfrm>
+          <a:prstGeom prst="rect">
+            <a:avLst/>
+          </a:prstGeom>
+        </p:spPr>
+        <p:txBody>
+          <a:bodyPr wrap="none">
+            <a:spAutoFit/>
+          </a:bodyPr>
+          <a:lstStyle/>
+          <a:p>
+            <a:r>
+              <a:rPr lang="en-US" altLang="en-US" dirty="0">
+                <a:latin typeface="Arial" panose="020B0604020202020204" pitchFamily="34" charset="0"/>
+                <a:ea typeface="-apple-system"/>
+              </a:rPr>
+              <a:t>Training set </a:t>
+            </a:r>
+            <a:r>
+              <a:rPr lang="en-US" altLang="en-US" i="1" dirty="0">
+                <a:latin typeface="Arial" panose="020B0604020202020204" pitchFamily="34" charset="0"/>
+                <a:ea typeface="-apple-system"/>
+              </a:rPr>
+              <a:t>T</a:t>
+            </a:r>
+            <a:endParaRPr lang="en-US" i="1" dirty="0"/>
+          </a:p>
+        </p:txBody>
+      </p:sp>
+      <p:grpSp>
+        <p:nvGrpSpPr>
+          <p:cNvPr id="18" name="Group 17">
+            <a:extLst>
+              <a:ext uri="{FF2B5EF4-FFF2-40B4-BE49-F238E27FC236}">
+                <a16:creationId xmlns:a16="http://schemas.microsoft.com/office/drawing/2014/main" id="{14800CAE-1863-4139-A693-3599CDC3E8F8}"/>
+              </a:ext>
+            </a:extLst>
+          </p:cNvPr>
+          <p:cNvGrpSpPr/>
+          <p:nvPr/>
+        </p:nvGrpSpPr>
+        <p:grpSpPr>
+          <a:xfrm>
+            <a:off x="686511" y="3619277"/>
+            <a:ext cx="1833331" cy="2407086"/>
+            <a:chOff x="2400300" y="400467"/>
+            <a:chExt cx="2149688" cy="2822449"/>
+          </a:xfrm>
+        </p:grpSpPr>
+        <p:sp>
+          <p:nvSpPr>
+            <p:cNvPr id="14" name="Rectangle 13">
+              <a:extLst>
+                <a:ext uri="{FF2B5EF4-FFF2-40B4-BE49-F238E27FC236}">
+                  <a16:creationId xmlns:a16="http://schemas.microsoft.com/office/drawing/2014/main" id="{C3E20849-527F-4DBA-A488-6D8780372495}"/>
+                </a:ext>
+              </a:extLst>
+            </p:cNvPr>
+            <p:cNvSpPr/>
+            <p:nvPr/>
+          </p:nvSpPr>
+          <p:spPr>
+            <a:xfrm>
+              <a:off x="2607211" y="633844"/>
+              <a:ext cx="1942777" cy="2589072"/>
+            </a:xfrm>
+            <a:prstGeom prst="rect">
+              <a:avLst/>
+            </a:prstGeom>
+            <a:solidFill>
+              <a:schemeClr val="bg1"/>
+            </a:solidFill>
+            <a:ln>
+              <a:solidFill>
+                <a:schemeClr val="tx1"/>
+              </a:solidFill>
+            </a:ln>
+          </p:spPr>
+          <p:style>
+            <a:lnRef idx="2">
+              <a:schemeClr val="accent1">
+                <a:shade val="50000"/>
+              </a:schemeClr>
+            </a:lnRef>
+            <a:fillRef idx="1">
+              <a:schemeClr val="accent1"/>
+            </a:fillRef>
+            <a:effectRef idx="0">
+              <a:schemeClr val="accent1"/>
+            </a:effectRef>
+            <a:fontRef idx="minor">
+              <a:schemeClr val="lt1"/>
+            </a:fontRef>
+          </p:style>
+          <p:txBody>
+            <a:bodyPr rtlCol="0" anchor="ctr"/>
+            <a:lstStyle/>
+            <a:p>
+              <a:pPr algn="ctr"/>
+              <a:endParaRPr lang="en-US"/>
+            </a:p>
+          </p:txBody>
+        </p:sp>
+        <p:sp>
+          <p:nvSpPr>
+            <p:cNvPr id="15" name="Rectangle 14">
+              <a:extLst>
+                <a:ext uri="{FF2B5EF4-FFF2-40B4-BE49-F238E27FC236}">
+                  <a16:creationId xmlns:a16="http://schemas.microsoft.com/office/drawing/2014/main" id="{B63F4B76-5FB1-404F-94AA-BDC2F864C8E1}"/>
+                </a:ext>
+              </a:extLst>
+            </p:cNvPr>
+            <p:cNvSpPr/>
+            <p:nvPr/>
+          </p:nvSpPr>
+          <p:spPr>
+            <a:xfrm>
+              <a:off x="2543825" y="556149"/>
+              <a:ext cx="1942777" cy="2589072"/>
+            </a:xfrm>
+            <a:prstGeom prst="rect">
+              <a:avLst/>
+            </a:prstGeom>
+            <a:solidFill>
+              <a:schemeClr val="bg1"/>
+            </a:solidFill>
+            <a:ln>
+              <a:solidFill>
+                <a:schemeClr val="tx1"/>
+              </a:solidFill>
+            </a:ln>
+          </p:spPr>
+          <p:style>
+            <a:lnRef idx="2">
+              <a:schemeClr val="accent1">
+                <a:shade val="50000"/>
+              </a:schemeClr>
+            </a:lnRef>
+            <a:fillRef idx="1">
+              <a:schemeClr val="accent1"/>
+            </a:fillRef>
+            <a:effectRef idx="0">
+              <a:schemeClr val="accent1"/>
+            </a:effectRef>
+            <a:fontRef idx="minor">
+              <a:schemeClr val="lt1"/>
+            </a:fontRef>
+          </p:style>
+          <p:txBody>
+            <a:bodyPr rtlCol="0" anchor="ctr"/>
+            <a:lstStyle/>
+            <a:p>
+              <a:pPr algn="ctr"/>
+              <a:endParaRPr lang="en-US"/>
+            </a:p>
+          </p:txBody>
+        </p:sp>
+        <p:sp>
+          <p:nvSpPr>
+            <p:cNvPr id="16" name="Rectangle 15">
+              <a:extLst>
+                <a:ext uri="{FF2B5EF4-FFF2-40B4-BE49-F238E27FC236}">
+                  <a16:creationId xmlns:a16="http://schemas.microsoft.com/office/drawing/2014/main" id="{3543D0BD-AD41-4D66-88D6-223BDA0408FE}"/>
+                </a:ext>
+              </a:extLst>
+            </p:cNvPr>
+            <p:cNvSpPr/>
+            <p:nvPr/>
+          </p:nvSpPr>
+          <p:spPr>
+            <a:xfrm>
+              <a:off x="2480439" y="478308"/>
+              <a:ext cx="1942777" cy="2589072"/>
+            </a:xfrm>
+            <a:prstGeom prst="rect">
+              <a:avLst/>
+            </a:prstGeom>
+            <a:solidFill>
+              <a:schemeClr val="bg1"/>
+            </a:solidFill>
+            <a:ln>
+              <a:solidFill>
+                <a:schemeClr val="tx1"/>
+              </a:solidFill>
+            </a:ln>
+          </p:spPr>
+          <p:style>
+            <a:lnRef idx="2">
+              <a:schemeClr val="accent1">
+                <a:shade val="50000"/>
+              </a:schemeClr>
+            </a:lnRef>
+            <a:fillRef idx="1">
+              <a:schemeClr val="accent1"/>
+            </a:fillRef>
+            <a:effectRef idx="0">
+              <a:schemeClr val="accent1"/>
+            </a:effectRef>
+            <a:fontRef idx="minor">
+              <a:schemeClr val="lt1"/>
+            </a:fontRef>
+          </p:style>
+          <p:txBody>
+            <a:bodyPr rtlCol="0" anchor="ctr"/>
+            <a:lstStyle/>
+            <a:p>
+              <a:pPr algn="ctr"/>
+              <a:endParaRPr lang="en-US"/>
+            </a:p>
+          </p:txBody>
+        </p:sp>
+        <p:pic>
+          <p:nvPicPr>
+            <p:cNvPr id="17" name="Picture 16" descr="A close up of a bottle&#10;&#10;Description automatically generated">
+              <a:extLst>
+                <a:ext uri="{FF2B5EF4-FFF2-40B4-BE49-F238E27FC236}">
+                  <a16:creationId xmlns:a16="http://schemas.microsoft.com/office/drawing/2014/main" id="{5C612992-BDED-4A05-A2CC-189896CEAFCA}"/>
+                </a:ext>
+              </a:extLst>
+            </p:cNvPr>
+            <p:cNvPicPr>
+              <a:picLocks noChangeAspect="1"/>
+            </p:cNvPicPr>
+            <p:nvPr/>
+          </p:nvPicPr>
+          <p:blipFill>
+            <a:blip r:embed="rId2">
+              <a:extLst>
+                <a:ext uri="{28A0092B-C50C-407E-A947-70E740481C1C}">
+                  <a14:useLocalDpi xmlns:a14="http://schemas.microsoft.com/office/drawing/2010/main" val="0"/>
+                </a:ext>
+              </a:extLst>
+            </a:blip>
+            <a:stretch>
+              <a:fillRect/>
+            </a:stretch>
+          </p:blipFill>
+          <p:spPr>
+            <a:xfrm>
+              <a:off x="2400300" y="400467"/>
+              <a:ext cx="1942777" cy="2589072"/>
+            </a:xfrm>
+            <a:prstGeom prst="rect">
+              <a:avLst/>
+            </a:prstGeom>
+          </p:spPr>
+        </p:pic>
+      </p:grpSp>
+      <p:pic>
+        <p:nvPicPr>
+          <p:cNvPr id="1027" name="Picture 3" descr="pipeline.jpg">
+            <a:extLst>
+              <a:ext uri="{FF2B5EF4-FFF2-40B4-BE49-F238E27FC236}">
+                <a16:creationId xmlns:a16="http://schemas.microsoft.com/office/drawing/2014/main" id="{BFD15644-B4CD-4D14-B00A-9F7B4BB3AC88}"/>
+              </a:ext>
+            </a:extLst>
+          </p:cNvPr>
+          <p:cNvPicPr>
+            <a:picLocks noChangeAspect="1" noChangeArrowheads="1"/>
+          </p:cNvPicPr>
+          <p:nvPr/>
+        </p:nvPicPr>
+        <p:blipFill rotWithShape="1">
+          <a:blip r:embed="rId3">
+            <a:extLst>
+              <a:ext uri="{28A0092B-C50C-407E-A947-70E740481C1C}">
+                <a14:useLocalDpi xmlns:a14="http://schemas.microsoft.com/office/drawing/2010/main" val="0"/>
+              </a:ext>
+            </a:extLst>
+          </a:blip>
+          <a:srcRect l="45259" t="9629" r="46207" b="60764"/>
+          <a:stretch/>
+        </p:blipFill>
+        <p:spPr bwMode="auto">
+          <a:xfrm>
+            <a:off x="5430284" y="973357"/>
+            <a:ext cx="2134919" cy="2857342"/>
+          </a:xfrm>
+          <a:prstGeom prst="rect">
+            <a:avLst/>
+          </a:prstGeom>
+          <a:noFill/>
+          <a:extLst>
+            <a:ext uri="{909E8E84-426E-40DD-AFC4-6F175D3DCCD1}">
+              <a14:hiddenFill xmlns:a14="http://schemas.microsoft.com/office/drawing/2010/main">
+                <a:solidFill>
+                  <a:srgbClr val="FFFFFF"/>
+                </a:solidFill>
+              </a14:hiddenFill>
+            </a:ext>
+          </a:extLst>
+        </p:spPr>
+      </p:pic>
+      <p:sp>
+        <p:nvSpPr>
+          <p:cNvPr id="21" name="Rectangle 20">
+            <a:extLst>
+              <a:ext uri="{FF2B5EF4-FFF2-40B4-BE49-F238E27FC236}">
+                <a16:creationId xmlns:a16="http://schemas.microsoft.com/office/drawing/2014/main" id="{E1D4DE7A-1D00-4FFF-BC81-1C1A0F6C25FD}"/>
+              </a:ext>
+            </a:extLst>
+          </p:cNvPr>
+          <p:cNvSpPr/>
+          <p:nvPr/>
+        </p:nvSpPr>
+        <p:spPr>
+          <a:xfrm>
+            <a:off x="5571848" y="3619719"/>
+            <a:ext cx="1723549" cy="369332"/>
+          </a:xfrm>
+          <a:prstGeom prst="rect">
+            <a:avLst/>
+          </a:prstGeom>
+        </p:spPr>
+        <p:txBody>
+          <a:bodyPr wrap="none">
+            <a:spAutoFit/>
+          </a:bodyPr>
+          <a:lstStyle/>
+          <a:p>
+            <a:r>
+              <a:rPr lang="en-US" altLang="en-US" dirty="0">
+                <a:latin typeface="Arial" panose="020B0604020202020204" pitchFamily="34" charset="0"/>
+                <a:ea typeface="-apple-system"/>
+              </a:rPr>
+              <a:t>Detection DNN</a:t>
+            </a:r>
+            <a:endParaRPr lang="en-US" dirty="0"/>
+          </a:p>
+        </p:txBody>
+      </p:sp>
+      <p:grpSp>
+        <p:nvGrpSpPr>
+          <p:cNvPr id="19" name="Group 18">
+            <a:extLst>
+              <a:ext uri="{FF2B5EF4-FFF2-40B4-BE49-F238E27FC236}">
+                <a16:creationId xmlns:a16="http://schemas.microsoft.com/office/drawing/2014/main" id="{411C3111-7D85-460C-A9BA-6AB71EB43702}"/>
+              </a:ext>
+            </a:extLst>
+          </p:cNvPr>
+          <p:cNvGrpSpPr/>
+          <p:nvPr/>
+        </p:nvGrpSpPr>
+        <p:grpSpPr>
+          <a:xfrm>
+            <a:off x="720345" y="259850"/>
+            <a:ext cx="1819043" cy="2410026"/>
+            <a:chOff x="5716564" y="2199601"/>
+            <a:chExt cx="2132935" cy="2825897"/>
+          </a:xfrm>
+        </p:grpSpPr>
+        <p:sp>
+          <p:nvSpPr>
+            <p:cNvPr id="23" name="Rectangle 22">
+              <a:extLst>
+                <a:ext uri="{FF2B5EF4-FFF2-40B4-BE49-F238E27FC236}">
+                  <a16:creationId xmlns:a16="http://schemas.microsoft.com/office/drawing/2014/main" id="{CF84C033-6C07-4825-B411-31EE3E63838A}"/>
+                </a:ext>
+              </a:extLst>
+            </p:cNvPr>
+            <p:cNvSpPr/>
+            <p:nvPr/>
+          </p:nvSpPr>
+          <p:spPr>
+            <a:xfrm>
+              <a:off x="5906722" y="2436426"/>
+              <a:ext cx="1942777" cy="2589072"/>
+            </a:xfrm>
+            <a:prstGeom prst="rect">
+              <a:avLst/>
+            </a:prstGeom>
+            <a:solidFill>
+              <a:schemeClr val="bg1"/>
+            </a:solidFill>
+            <a:ln>
+              <a:solidFill>
+                <a:schemeClr val="tx1"/>
+              </a:solidFill>
+            </a:ln>
+          </p:spPr>
+          <p:style>
+            <a:lnRef idx="2">
+              <a:schemeClr val="accent1">
+                <a:shade val="50000"/>
+              </a:schemeClr>
+            </a:lnRef>
+            <a:fillRef idx="1">
+              <a:schemeClr val="accent1"/>
+            </a:fillRef>
+            <a:effectRef idx="0">
+              <a:schemeClr val="accent1"/>
+            </a:effectRef>
+            <a:fontRef idx="minor">
+              <a:schemeClr val="lt1"/>
+            </a:fontRef>
+          </p:style>
+          <p:txBody>
+            <a:bodyPr rtlCol="0" anchor="ctr"/>
+            <a:lstStyle/>
+            <a:p>
+              <a:pPr algn="ctr"/>
+              <a:endParaRPr lang="en-US"/>
+            </a:p>
+          </p:txBody>
+        </p:sp>
+        <p:sp>
+          <p:nvSpPr>
+            <p:cNvPr id="24" name="Rectangle 23">
+              <a:extLst>
+                <a:ext uri="{FF2B5EF4-FFF2-40B4-BE49-F238E27FC236}">
+                  <a16:creationId xmlns:a16="http://schemas.microsoft.com/office/drawing/2014/main" id="{256E3943-A99C-4A96-9E41-24287291CE78}"/>
+                </a:ext>
+              </a:extLst>
+            </p:cNvPr>
+            <p:cNvSpPr/>
+            <p:nvPr/>
+          </p:nvSpPr>
+          <p:spPr>
+            <a:xfrm>
+              <a:off x="5843336" y="2358731"/>
+              <a:ext cx="1942777" cy="2589072"/>
+            </a:xfrm>
+            <a:prstGeom prst="rect">
+              <a:avLst/>
+            </a:prstGeom>
+            <a:solidFill>
+              <a:schemeClr val="bg1"/>
+            </a:solidFill>
+            <a:ln>
+              <a:solidFill>
+                <a:schemeClr val="tx1"/>
+              </a:solidFill>
+            </a:ln>
+          </p:spPr>
+          <p:style>
+            <a:lnRef idx="2">
+              <a:schemeClr val="accent1">
+                <a:shade val="50000"/>
+              </a:schemeClr>
+            </a:lnRef>
+            <a:fillRef idx="1">
+              <a:schemeClr val="accent1"/>
+            </a:fillRef>
+            <a:effectRef idx="0">
+              <a:schemeClr val="accent1"/>
+            </a:effectRef>
+            <a:fontRef idx="minor">
+              <a:schemeClr val="lt1"/>
+            </a:fontRef>
+          </p:style>
+          <p:txBody>
+            <a:bodyPr rtlCol="0" anchor="ctr"/>
+            <a:lstStyle/>
+            <a:p>
+              <a:pPr algn="ctr"/>
+              <a:endParaRPr lang="en-US"/>
+            </a:p>
+          </p:txBody>
+        </p:sp>
+        <p:sp>
+          <p:nvSpPr>
+            <p:cNvPr id="25" name="Rectangle 24">
+              <a:extLst>
+                <a:ext uri="{FF2B5EF4-FFF2-40B4-BE49-F238E27FC236}">
+                  <a16:creationId xmlns:a16="http://schemas.microsoft.com/office/drawing/2014/main" id="{C47C1D3F-00FF-4658-A242-6AB9C4644CB0}"/>
+                </a:ext>
+              </a:extLst>
+            </p:cNvPr>
+            <p:cNvSpPr/>
+            <p:nvPr/>
+          </p:nvSpPr>
+          <p:spPr>
+            <a:xfrm>
+              <a:off x="5779950" y="2280890"/>
+              <a:ext cx="1942777" cy="2589072"/>
+            </a:xfrm>
+            <a:prstGeom prst="rect">
+              <a:avLst/>
+            </a:prstGeom>
+            <a:solidFill>
+              <a:schemeClr val="bg1"/>
+            </a:solidFill>
+            <a:ln>
+              <a:solidFill>
+                <a:schemeClr val="tx1"/>
+              </a:solidFill>
+            </a:ln>
+          </p:spPr>
+          <p:style>
+            <a:lnRef idx="2">
+              <a:schemeClr val="accent1">
+                <a:shade val="50000"/>
+              </a:schemeClr>
+            </a:lnRef>
+            <a:fillRef idx="1">
+              <a:schemeClr val="accent1"/>
+            </a:fillRef>
+            <a:effectRef idx="0">
+              <a:schemeClr val="accent1"/>
+            </a:effectRef>
+            <a:fontRef idx="minor">
+              <a:schemeClr val="lt1"/>
+            </a:fontRef>
+          </p:style>
+          <p:txBody>
+            <a:bodyPr rtlCol="0" anchor="ctr"/>
+            <a:lstStyle/>
+            <a:p>
+              <a:pPr algn="ctr"/>
+              <a:endParaRPr lang="en-US"/>
+            </a:p>
+          </p:txBody>
+        </p:sp>
+        <p:pic>
+          <p:nvPicPr>
+            <p:cNvPr id="27" name="Picture 26" descr="A picture containing table, indoor&#10;&#10;Description automatically generated">
+              <a:extLst>
+                <a:ext uri="{FF2B5EF4-FFF2-40B4-BE49-F238E27FC236}">
+                  <a16:creationId xmlns:a16="http://schemas.microsoft.com/office/drawing/2014/main" id="{4B3DE23C-FB9C-4D30-9F09-A9EC46508939}"/>
+                </a:ext>
+              </a:extLst>
+            </p:cNvPr>
+            <p:cNvPicPr>
+              <a:picLocks noChangeAspect="1"/>
+            </p:cNvPicPr>
+            <p:nvPr/>
+          </p:nvPicPr>
+          <p:blipFill>
+            <a:blip r:embed="rId4">
+              <a:extLst>
+                <a:ext uri="{28A0092B-C50C-407E-A947-70E740481C1C}">
+                  <a14:useLocalDpi xmlns:a14="http://schemas.microsoft.com/office/drawing/2010/main" val="0"/>
+                </a:ext>
+              </a:extLst>
+            </a:blip>
+            <a:stretch>
+              <a:fillRect/>
+            </a:stretch>
+          </p:blipFill>
+          <p:spPr>
+            <a:xfrm>
+              <a:off x="5716564" y="2199601"/>
+              <a:ext cx="1942777" cy="2594867"/>
+            </a:xfrm>
+            <a:prstGeom prst="rect">
+              <a:avLst/>
+            </a:prstGeom>
+          </p:spPr>
+        </p:pic>
+      </p:grpSp>
+      <p:sp>
+        <p:nvSpPr>
+          <p:cNvPr id="29" name="Rectangle 28">
+            <a:extLst>
+              <a:ext uri="{FF2B5EF4-FFF2-40B4-BE49-F238E27FC236}">
+                <a16:creationId xmlns:a16="http://schemas.microsoft.com/office/drawing/2014/main" id="{50536F1F-9AFD-4E9C-8E51-F4C9E0AFFDEF}"/>
+              </a:ext>
+            </a:extLst>
+          </p:cNvPr>
+          <p:cNvSpPr/>
+          <p:nvPr/>
+        </p:nvSpPr>
+        <p:spPr>
+          <a:xfrm>
+            <a:off x="310803" y="2739283"/>
+            <a:ext cx="2505814" cy="369332"/>
+          </a:xfrm>
+          <a:prstGeom prst="rect">
+            <a:avLst/>
+          </a:prstGeom>
+        </p:spPr>
+        <p:txBody>
+          <a:bodyPr wrap="none">
+            <a:spAutoFit/>
+          </a:bodyPr>
+          <a:lstStyle/>
+          <a:p>
+            <a:r>
+              <a:rPr lang="en-US" altLang="en-US" dirty="0">
+                <a:latin typeface="Arial" panose="020B0604020202020204" pitchFamily="34" charset="0"/>
+                <a:ea typeface="-apple-system"/>
+              </a:rPr>
+              <a:t>Negative candidates </a:t>
+            </a:r>
+            <a:r>
+              <a:rPr lang="en-US" altLang="en-US" i="1" dirty="0">
+                <a:latin typeface="Arial" panose="020B0604020202020204" pitchFamily="34" charset="0"/>
+                <a:ea typeface="-apple-system"/>
+              </a:rPr>
+              <a:t>U</a:t>
+            </a:r>
+            <a:endParaRPr lang="en-US" i="1" dirty="0"/>
+          </a:p>
+        </p:txBody>
+      </p:sp>
+      <p:cxnSp>
+        <p:nvCxnSpPr>
+          <p:cNvPr id="30" name="Straight Arrow Connector 29">
+            <a:extLst>
+              <a:ext uri="{FF2B5EF4-FFF2-40B4-BE49-F238E27FC236}">
+                <a16:creationId xmlns:a16="http://schemas.microsoft.com/office/drawing/2014/main" id="{0B53A6CF-4B97-41C5-BDDF-2D2DD2BFAA88}"/>
+              </a:ext>
+            </a:extLst>
+          </p:cNvPr>
+          <p:cNvCxnSpPr>
+            <a:cxnSpLocks/>
+          </p:cNvCxnSpPr>
+          <p:nvPr/>
+        </p:nvCxnSpPr>
+        <p:spPr>
+          <a:xfrm>
+            <a:off x="2769043" y="1840114"/>
+            <a:ext cx="2378627" cy="0"/>
+          </a:xfrm>
+          <a:prstGeom prst="straightConnector1">
+            <a:avLst/>
+          </a:prstGeom>
+          <a:ln w="25400">
+            <a:solidFill>
+              <a:schemeClr val="accent1"/>
+            </a:solidFill>
+            <a:tailEnd type="triangle" w="lg" len="med"/>
+          </a:ln>
+        </p:spPr>
+        <p:style>
+          <a:lnRef idx="1">
+            <a:schemeClr val="accent1"/>
+          </a:lnRef>
+          <a:fillRef idx="0">
+            <a:schemeClr val="accent1"/>
+          </a:fillRef>
+          <a:effectRef idx="0">
+            <a:schemeClr val="accent1"/>
+          </a:effectRef>
+          <a:fontRef idx="minor">
+            <a:schemeClr val="tx1"/>
+          </a:fontRef>
+        </p:style>
+      </p:cxnSp>
+      <p:sp>
+        <p:nvSpPr>
+          <p:cNvPr id="33" name="Rectangle 32">
+            <a:extLst>
+              <a:ext uri="{FF2B5EF4-FFF2-40B4-BE49-F238E27FC236}">
+                <a16:creationId xmlns:a16="http://schemas.microsoft.com/office/drawing/2014/main" id="{DB8948EF-049F-4BC8-9762-44B24986CB4D}"/>
+              </a:ext>
+            </a:extLst>
+          </p:cNvPr>
+          <p:cNvSpPr/>
+          <p:nvPr/>
+        </p:nvSpPr>
+        <p:spPr>
+          <a:xfrm>
+            <a:off x="3575435" y="2770651"/>
+            <a:ext cx="1547698" cy="646331"/>
+          </a:xfrm>
+          <a:prstGeom prst="rect">
+            <a:avLst/>
+          </a:prstGeom>
+        </p:spPr>
+        <p:txBody>
+          <a:bodyPr wrap="square">
+            <a:spAutoFit/>
+          </a:bodyPr>
+          <a:lstStyle/>
+          <a:p>
+            <a:pPr algn="ctr"/>
+            <a:r>
+              <a:rPr lang="en-US" altLang="en-US" dirty="0">
+                <a:solidFill>
+                  <a:schemeClr val="accent1"/>
+                </a:solidFill>
+                <a:latin typeface="Arial" panose="020B0604020202020204" pitchFamily="34" charset="0"/>
+                <a:ea typeface="-apple-system"/>
+              </a:rPr>
+              <a:t>(1) Train model on T</a:t>
+            </a:r>
+            <a:endParaRPr lang="en-US" dirty="0">
+              <a:solidFill>
+                <a:schemeClr val="accent1"/>
+              </a:solidFill>
+            </a:endParaRPr>
+          </a:p>
+        </p:txBody>
+      </p:sp>
+      <p:sp>
+        <p:nvSpPr>
+          <p:cNvPr id="41" name="Rectangle 40">
+            <a:extLst>
+              <a:ext uri="{FF2B5EF4-FFF2-40B4-BE49-F238E27FC236}">
+                <a16:creationId xmlns:a16="http://schemas.microsoft.com/office/drawing/2014/main" id="{BF135BFC-242F-46AA-A7AA-76B1F9C8EA38}"/>
+              </a:ext>
+            </a:extLst>
+          </p:cNvPr>
+          <p:cNvSpPr/>
+          <p:nvPr/>
+        </p:nvSpPr>
+        <p:spPr>
+          <a:xfrm>
+            <a:off x="2798057" y="1467438"/>
+            <a:ext cx="2152800" cy="646331"/>
+          </a:xfrm>
+          <a:prstGeom prst="rect">
+            <a:avLst/>
+          </a:prstGeom>
+        </p:spPr>
+        <p:txBody>
+          <a:bodyPr wrap="square">
+            <a:spAutoFit/>
+          </a:bodyPr>
+          <a:lstStyle/>
+          <a:p>
+            <a:pPr algn="ctr"/>
+            <a:r>
+              <a:rPr lang="en-US" altLang="en-US" dirty="0">
+                <a:solidFill>
+                  <a:schemeClr val="accent1"/>
+                </a:solidFill>
+                <a:latin typeface="Arial" panose="020B0604020202020204" pitchFamily="34" charset="0"/>
+                <a:ea typeface="-apple-system"/>
+              </a:rPr>
+              <a:t>(2a) Score on U</a:t>
+            </a:r>
+            <a:br>
+              <a:rPr lang="en-US" altLang="en-US" dirty="0">
+                <a:solidFill>
+                  <a:schemeClr val="accent1"/>
+                </a:solidFill>
+                <a:latin typeface="Arial" panose="020B0604020202020204" pitchFamily="34" charset="0"/>
+                <a:ea typeface="-apple-system"/>
+              </a:rPr>
+            </a:br>
+            <a:endParaRPr lang="en-US" dirty="0">
+              <a:solidFill>
+                <a:schemeClr val="accent1"/>
+              </a:solidFill>
+            </a:endParaRPr>
+          </a:p>
+        </p:txBody>
+      </p:sp>
+      <p:cxnSp>
+        <p:nvCxnSpPr>
+          <p:cNvPr id="44" name="Straight Arrow Connector 43">
+            <a:extLst>
+              <a:ext uri="{FF2B5EF4-FFF2-40B4-BE49-F238E27FC236}">
+                <a16:creationId xmlns:a16="http://schemas.microsoft.com/office/drawing/2014/main" id="{F026E089-E78E-4E55-9AFF-AD0AD647EE74}"/>
+              </a:ext>
+            </a:extLst>
+          </p:cNvPr>
+          <p:cNvCxnSpPr>
+            <a:cxnSpLocks/>
+          </p:cNvCxnSpPr>
+          <p:nvPr/>
+        </p:nvCxnSpPr>
+        <p:spPr>
+          <a:xfrm>
+            <a:off x="7457667" y="2379429"/>
+            <a:ext cx="2024668" cy="0"/>
+          </a:xfrm>
+          <a:prstGeom prst="straightConnector1">
+            <a:avLst/>
+          </a:prstGeom>
+          <a:ln w="25400">
+            <a:solidFill>
+              <a:schemeClr val="accent1"/>
+            </a:solidFill>
+            <a:tailEnd type="triangle" w="lg" len="med"/>
+          </a:ln>
+        </p:spPr>
+        <p:style>
+          <a:lnRef idx="1">
+            <a:schemeClr val="accent1"/>
+          </a:lnRef>
+          <a:fillRef idx="0">
+            <a:schemeClr val="accent1"/>
+          </a:fillRef>
+          <a:effectRef idx="0">
+            <a:schemeClr val="accent1"/>
+          </a:effectRef>
+          <a:fontRef idx="minor">
+            <a:schemeClr val="tx1"/>
+          </a:fontRef>
+        </p:style>
+      </p:cxnSp>
+      <p:sp>
+        <p:nvSpPr>
+          <p:cNvPr id="47" name="Rectangle 46">
+            <a:extLst>
+              <a:ext uri="{FF2B5EF4-FFF2-40B4-BE49-F238E27FC236}">
+                <a16:creationId xmlns:a16="http://schemas.microsoft.com/office/drawing/2014/main" id="{69FEC8A5-562A-4450-A3C1-BCD76BDBE2A9}"/>
+              </a:ext>
+            </a:extLst>
+          </p:cNvPr>
+          <p:cNvSpPr/>
+          <p:nvPr/>
+        </p:nvSpPr>
+        <p:spPr>
+          <a:xfrm>
+            <a:off x="7530330" y="1681190"/>
+            <a:ext cx="1828705" cy="923330"/>
+          </a:xfrm>
+          <a:prstGeom prst="rect">
+            <a:avLst/>
+          </a:prstGeom>
+        </p:spPr>
+        <p:txBody>
+          <a:bodyPr wrap="square">
+            <a:spAutoFit/>
+          </a:bodyPr>
+          <a:lstStyle/>
+          <a:p>
+            <a:pPr algn="ctr"/>
+            <a:r>
+              <a:rPr lang="en-US" altLang="en-US" dirty="0">
+                <a:solidFill>
+                  <a:schemeClr val="accent1"/>
+                </a:solidFill>
+                <a:latin typeface="Arial" panose="020B0604020202020204" pitchFamily="34" charset="0"/>
+                <a:ea typeface="-apple-system"/>
+              </a:rPr>
+              <a:t>(2b) Scoring results on U</a:t>
+            </a:r>
+            <a:br>
+              <a:rPr lang="en-US" altLang="en-US" dirty="0">
+                <a:solidFill>
+                  <a:schemeClr val="accent1"/>
+                </a:solidFill>
+                <a:latin typeface="Arial" panose="020B0604020202020204" pitchFamily="34" charset="0"/>
+                <a:ea typeface="-apple-system"/>
+              </a:rPr>
+            </a:br>
+            <a:endParaRPr lang="en-US" dirty="0">
+              <a:solidFill>
+                <a:schemeClr val="accent1"/>
+              </a:solidFill>
+            </a:endParaRPr>
+          </a:p>
+        </p:txBody>
+      </p:sp>
+      <p:sp>
+        <p:nvSpPr>
+          <p:cNvPr id="48" name="Rectangle 47">
+            <a:extLst>
+              <a:ext uri="{FF2B5EF4-FFF2-40B4-BE49-F238E27FC236}">
+                <a16:creationId xmlns:a16="http://schemas.microsoft.com/office/drawing/2014/main" id="{3442D06D-FA1A-4BAD-928C-D8913E2E2873}"/>
+              </a:ext>
+            </a:extLst>
+          </p:cNvPr>
+          <p:cNvSpPr/>
+          <p:nvPr/>
+        </p:nvSpPr>
+        <p:spPr>
+          <a:xfrm>
+            <a:off x="9333464" y="422880"/>
+            <a:ext cx="2295164" cy="646331"/>
+          </a:xfrm>
+          <a:prstGeom prst="rect">
+            <a:avLst/>
+          </a:prstGeom>
+        </p:spPr>
+        <p:txBody>
+          <a:bodyPr wrap="square">
+            <a:spAutoFit/>
+          </a:bodyPr>
+          <a:lstStyle/>
+          <a:p>
+            <a:pPr algn="ctr"/>
+            <a:r>
+              <a:rPr lang="en-US" altLang="en-US" dirty="0">
+                <a:latin typeface="Arial" panose="020B0604020202020204" pitchFamily="34" charset="0"/>
+              </a:rPr>
+              <a:t>Images in U with detected objects</a:t>
+            </a:r>
+            <a:endParaRPr lang="en-US" dirty="0">
+              <a:latin typeface="Arial" panose="020B0604020202020204" pitchFamily="34" charset="0"/>
+            </a:endParaRPr>
+          </a:p>
+        </p:txBody>
+      </p:sp>
+      <p:sp>
+        <p:nvSpPr>
+          <p:cNvPr id="52" name="Rectangle 51">
+            <a:extLst>
+              <a:ext uri="{FF2B5EF4-FFF2-40B4-BE49-F238E27FC236}">
+                <a16:creationId xmlns:a16="http://schemas.microsoft.com/office/drawing/2014/main" id="{1F8F620F-578D-43CE-95EC-A7E2F78F702E}"/>
+              </a:ext>
+            </a:extLst>
+          </p:cNvPr>
+          <p:cNvSpPr/>
+          <p:nvPr/>
+        </p:nvSpPr>
+        <p:spPr>
+          <a:xfrm>
+            <a:off x="7135363" y="4806587"/>
+            <a:ext cx="3345683" cy="1200329"/>
+          </a:xfrm>
+          <a:prstGeom prst="rect">
+            <a:avLst/>
+          </a:prstGeom>
+        </p:spPr>
+        <p:txBody>
+          <a:bodyPr wrap="square">
+            <a:spAutoFit/>
+          </a:bodyPr>
+          <a:lstStyle/>
+          <a:p>
+            <a:pPr algn="ctr"/>
+            <a:r>
+              <a:rPr lang="en-US" altLang="en-US" dirty="0">
+                <a:solidFill>
+                  <a:schemeClr val="accent1"/>
+                </a:solidFill>
+                <a:latin typeface="Arial" panose="020B0604020202020204" pitchFamily="34" charset="0"/>
+                <a:ea typeface="-apple-system"/>
+              </a:rPr>
+              <a:t>(3) Add most incorrect images from U to training set T</a:t>
+            </a:r>
+            <a:br>
+              <a:rPr lang="en-US" altLang="en-US" dirty="0">
+                <a:solidFill>
+                  <a:schemeClr val="accent1"/>
+                </a:solidFill>
+                <a:latin typeface="Arial" panose="020B0604020202020204" pitchFamily="34" charset="0"/>
+                <a:ea typeface="-apple-system"/>
+              </a:rPr>
+            </a:br>
+            <a:br>
+              <a:rPr lang="en-US" altLang="en-US" dirty="0">
+                <a:solidFill>
+                  <a:schemeClr val="accent1"/>
+                </a:solidFill>
+                <a:latin typeface="Arial" panose="020B0604020202020204" pitchFamily="34" charset="0"/>
+                <a:ea typeface="-apple-system"/>
+              </a:rPr>
+            </a:br>
+            <a:endParaRPr lang="en-US" dirty="0">
+              <a:solidFill>
+                <a:schemeClr val="accent1"/>
+              </a:solidFill>
+            </a:endParaRPr>
+          </a:p>
+        </p:txBody>
+      </p:sp>
+      <p:cxnSp>
+        <p:nvCxnSpPr>
+          <p:cNvPr id="45" name="Straight Arrow Connector 44">
+            <a:extLst>
+              <a:ext uri="{FF2B5EF4-FFF2-40B4-BE49-F238E27FC236}">
+                <a16:creationId xmlns:a16="http://schemas.microsoft.com/office/drawing/2014/main" id="{0329616D-7CB7-4D37-805B-EB7DBB2A6452}"/>
+              </a:ext>
+            </a:extLst>
+          </p:cNvPr>
+          <p:cNvCxnSpPr>
+            <a:cxnSpLocks/>
+          </p:cNvCxnSpPr>
+          <p:nvPr/>
+        </p:nvCxnSpPr>
+        <p:spPr>
+          <a:xfrm>
+            <a:off x="3459408" y="2715707"/>
+            <a:ext cx="1708140" cy="0"/>
+          </a:xfrm>
+          <a:prstGeom prst="straightConnector1">
+            <a:avLst/>
+          </a:prstGeom>
+          <a:ln w="25400">
+            <a:solidFill>
+              <a:schemeClr val="accent1"/>
+            </a:solidFill>
+            <a:tailEnd type="triangle" w="lg" len="med"/>
+          </a:ln>
+        </p:spPr>
+        <p:style>
+          <a:lnRef idx="1">
+            <a:schemeClr val="accent1"/>
+          </a:lnRef>
+          <a:fillRef idx="0">
+            <a:schemeClr val="accent1"/>
+          </a:fillRef>
+          <a:effectRef idx="0">
+            <a:schemeClr val="accent1"/>
+          </a:effectRef>
+          <a:fontRef idx="minor">
+            <a:schemeClr val="tx1"/>
+          </a:fontRef>
+        </p:style>
+      </p:cxnSp>
+      <p:cxnSp>
+        <p:nvCxnSpPr>
+          <p:cNvPr id="50" name="Straight Arrow Connector 49">
+            <a:extLst>
+              <a:ext uri="{FF2B5EF4-FFF2-40B4-BE49-F238E27FC236}">
+                <a16:creationId xmlns:a16="http://schemas.microsoft.com/office/drawing/2014/main" id="{D9B734AC-1B2E-468C-88D4-48C55B282609}"/>
+              </a:ext>
+            </a:extLst>
+          </p:cNvPr>
+          <p:cNvCxnSpPr>
+            <a:cxnSpLocks/>
+          </p:cNvCxnSpPr>
+          <p:nvPr/>
+        </p:nvCxnSpPr>
+        <p:spPr>
+          <a:xfrm>
+            <a:off x="3463900" y="2715707"/>
+            <a:ext cx="17008" cy="2107113"/>
+          </a:xfrm>
+          <a:prstGeom prst="straightConnector1">
+            <a:avLst/>
+          </a:prstGeom>
+          <a:ln w="25400">
+            <a:solidFill>
+              <a:schemeClr val="accent1"/>
+            </a:solidFill>
+            <a:tailEnd type="none" w="lg" len="med"/>
+          </a:ln>
+        </p:spPr>
+        <p:style>
+          <a:lnRef idx="1">
+            <a:schemeClr val="accent1"/>
+          </a:lnRef>
+          <a:fillRef idx="0">
+            <a:schemeClr val="accent1"/>
+          </a:fillRef>
+          <a:effectRef idx="0">
+            <a:schemeClr val="accent1"/>
+          </a:effectRef>
+          <a:fontRef idx="minor">
+            <a:schemeClr val="tx1"/>
+          </a:fontRef>
+        </p:style>
+      </p:cxnSp>
+      <p:cxnSp>
+        <p:nvCxnSpPr>
+          <p:cNvPr id="53" name="Straight Arrow Connector 52">
+            <a:extLst>
+              <a:ext uri="{FF2B5EF4-FFF2-40B4-BE49-F238E27FC236}">
+                <a16:creationId xmlns:a16="http://schemas.microsoft.com/office/drawing/2014/main" id="{CD696D0A-4223-459E-BB89-DD52633BD363}"/>
+              </a:ext>
+            </a:extLst>
+          </p:cNvPr>
+          <p:cNvCxnSpPr>
+            <a:cxnSpLocks/>
+          </p:cNvCxnSpPr>
+          <p:nvPr/>
+        </p:nvCxnSpPr>
+        <p:spPr>
+          <a:xfrm flipH="1">
+            <a:off x="2788921" y="4822820"/>
+            <a:ext cx="691987" cy="0"/>
+          </a:xfrm>
+          <a:prstGeom prst="straightConnector1">
+            <a:avLst/>
+          </a:prstGeom>
+          <a:ln w="25400">
+            <a:solidFill>
+              <a:schemeClr val="accent1"/>
+            </a:solidFill>
+            <a:tailEnd type="none" w="lg" len="med"/>
+          </a:ln>
+        </p:spPr>
+        <p:style>
+          <a:lnRef idx="1">
+            <a:schemeClr val="accent1"/>
+          </a:lnRef>
+          <a:fillRef idx="0">
+            <a:schemeClr val="accent1"/>
+          </a:fillRef>
+          <a:effectRef idx="0">
+            <a:schemeClr val="accent1"/>
+          </a:effectRef>
+          <a:fontRef idx="minor">
+            <a:schemeClr val="tx1"/>
+          </a:fontRef>
+        </p:style>
+      </p:cxnSp>
+      <p:cxnSp>
+        <p:nvCxnSpPr>
+          <p:cNvPr id="59" name="Straight Arrow Connector 58">
+            <a:extLst>
+              <a:ext uri="{FF2B5EF4-FFF2-40B4-BE49-F238E27FC236}">
+                <a16:creationId xmlns:a16="http://schemas.microsoft.com/office/drawing/2014/main" id="{97BE59D9-9F10-4532-8565-DCE969A00440}"/>
+              </a:ext>
+            </a:extLst>
+          </p:cNvPr>
+          <p:cNvCxnSpPr>
+            <a:cxnSpLocks/>
+          </p:cNvCxnSpPr>
+          <p:nvPr/>
+        </p:nvCxnSpPr>
+        <p:spPr>
+          <a:xfrm flipH="1">
+            <a:off x="3546926" y="4806587"/>
+            <a:ext cx="7045755" cy="0"/>
+          </a:xfrm>
+          <a:prstGeom prst="straightConnector1">
+            <a:avLst/>
+          </a:prstGeom>
+          <a:ln w="25400">
+            <a:solidFill>
+              <a:schemeClr val="accent1"/>
+            </a:solidFill>
+            <a:tailEnd type="triangle" w="lg" len="med"/>
+          </a:ln>
+        </p:spPr>
+        <p:style>
+          <a:lnRef idx="1">
+            <a:schemeClr val="accent1"/>
+          </a:lnRef>
+          <a:fillRef idx="0">
+            <a:schemeClr val="accent1"/>
+          </a:fillRef>
+          <a:effectRef idx="0">
+            <a:schemeClr val="accent1"/>
+          </a:effectRef>
+          <a:fontRef idx="minor">
+            <a:schemeClr val="tx1"/>
+          </a:fontRef>
+        </p:style>
+      </p:cxnSp>
+      <p:cxnSp>
+        <p:nvCxnSpPr>
+          <p:cNvPr id="62" name="Straight Arrow Connector 61">
+            <a:extLst>
+              <a:ext uri="{FF2B5EF4-FFF2-40B4-BE49-F238E27FC236}">
+                <a16:creationId xmlns:a16="http://schemas.microsoft.com/office/drawing/2014/main" id="{9585610F-67B2-449D-8B09-4896D137C253}"/>
+              </a:ext>
+            </a:extLst>
+          </p:cNvPr>
+          <p:cNvCxnSpPr>
+            <a:cxnSpLocks/>
+          </p:cNvCxnSpPr>
+          <p:nvPr/>
+        </p:nvCxnSpPr>
+        <p:spPr>
+          <a:xfrm>
+            <a:off x="10592681" y="3685663"/>
+            <a:ext cx="0" cy="1120924"/>
+          </a:xfrm>
+          <a:prstGeom prst="straightConnector1">
+            <a:avLst/>
+          </a:prstGeom>
+          <a:ln w="25400">
+            <a:solidFill>
+              <a:schemeClr val="accent1"/>
+            </a:solidFill>
+            <a:tailEnd type="none" w="lg" len="med"/>
+          </a:ln>
+        </p:spPr>
+        <p:style>
+          <a:lnRef idx="1">
+            <a:schemeClr val="accent1"/>
+          </a:lnRef>
+          <a:fillRef idx="0">
+            <a:schemeClr val="accent1"/>
+          </a:fillRef>
+          <a:effectRef idx="0">
+            <a:schemeClr val="accent1"/>
+          </a:effectRef>
+          <a:fontRef idx="minor">
+            <a:schemeClr val="tx1"/>
+          </a:fontRef>
+        </p:style>
+      </p:cxnSp>
+      <p:grpSp>
+        <p:nvGrpSpPr>
+          <p:cNvPr id="38" name="Group 37">
+            <a:extLst>
+              <a:ext uri="{FF2B5EF4-FFF2-40B4-BE49-F238E27FC236}">
+                <a16:creationId xmlns:a16="http://schemas.microsoft.com/office/drawing/2014/main" id="{1F1B5618-1B42-42AF-9A1B-1D97FF9047D5}"/>
+              </a:ext>
+            </a:extLst>
+          </p:cNvPr>
+          <p:cNvGrpSpPr/>
+          <p:nvPr/>
+        </p:nvGrpSpPr>
+        <p:grpSpPr>
+          <a:xfrm>
+            <a:off x="9652612" y="1160971"/>
+            <a:ext cx="1819043" cy="2410026"/>
+            <a:chOff x="5716564" y="2199601"/>
+            <a:chExt cx="2132935" cy="2825897"/>
+          </a:xfrm>
+        </p:grpSpPr>
+        <p:sp>
+          <p:nvSpPr>
+            <p:cNvPr id="39" name="Rectangle 38">
+              <a:extLst>
+                <a:ext uri="{FF2B5EF4-FFF2-40B4-BE49-F238E27FC236}">
+                  <a16:creationId xmlns:a16="http://schemas.microsoft.com/office/drawing/2014/main" id="{F9408826-B96D-482E-8229-EB4B98C53768}"/>
+                </a:ext>
+              </a:extLst>
+            </p:cNvPr>
+            <p:cNvSpPr/>
+            <p:nvPr/>
+          </p:nvSpPr>
+          <p:spPr>
+            <a:xfrm>
+              <a:off x="5906722" y="2436426"/>
+              <a:ext cx="1942777" cy="2589072"/>
+            </a:xfrm>
+            <a:prstGeom prst="rect">
+              <a:avLst/>
+            </a:prstGeom>
+            <a:solidFill>
+              <a:schemeClr val="bg1"/>
+            </a:solidFill>
+            <a:ln>
+              <a:solidFill>
+                <a:schemeClr val="tx1"/>
+              </a:solidFill>
+            </a:ln>
+          </p:spPr>
+          <p:style>
+            <a:lnRef idx="2">
+              <a:schemeClr val="accent1">
+                <a:shade val="50000"/>
+              </a:schemeClr>
+            </a:lnRef>
+            <a:fillRef idx="1">
+              <a:schemeClr val="accent1"/>
+            </a:fillRef>
+            <a:effectRef idx="0">
+              <a:schemeClr val="accent1"/>
+            </a:effectRef>
+            <a:fontRef idx="minor">
+              <a:schemeClr val="lt1"/>
+            </a:fontRef>
+          </p:style>
+          <p:txBody>
+            <a:bodyPr rtlCol="0" anchor="ctr"/>
+            <a:lstStyle/>
+            <a:p>
+              <a:pPr algn="ctr"/>
+              <a:endParaRPr lang="en-US"/>
+            </a:p>
+          </p:txBody>
+        </p:sp>
+        <p:sp>
+          <p:nvSpPr>
+            <p:cNvPr id="40" name="Rectangle 39">
+              <a:extLst>
+                <a:ext uri="{FF2B5EF4-FFF2-40B4-BE49-F238E27FC236}">
+                  <a16:creationId xmlns:a16="http://schemas.microsoft.com/office/drawing/2014/main" id="{50250621-4B18-419E-A713-995217484A45}"/>
+                </a:ext>
+              </a:extLst>
+            </p:cNvPr>
+            <p:cNvSpPr/>
+            <p:nvPr/>
+          </p:nvSpPr>
+          <p:spPr>
+            <a:xfrm>
+              <a:off x="5843336" y="2358731"/>
+              <a:ext cx="1942777" cy="2589072"/>
+            </a:xfrm>
+            <a:prstGeom prst="rect">
+              <a:avLst/>
+            </a:prstGeom>
+            <a:solidFill>
+              <a:schemeClr val="bg1"/>
+            </a:solidFill>
+            <a:ln>
+              <a:solidFill>
+                <a:schemeClr val="tx1"/>
+              </a:solidFill>
+            </a:ln>
+          </p:spPr>
+          <p:style>
+            <a:lnRef idx="2">
+              <a:schemeClr val="accent1">
+                <a:shade val="50000"/>
+              </a:schemeClr>
+            </a:lnRef>
+            <a:fillRef idx="1">
+              <a:schemeClr val="accent1"/>
+            </a:fillRef>
+            <a:effectRef idx="0">
+              <a:schemeClr val="accent1"/>
+            </a:effectRef>
+            <a:fontRef idx="minor">
+              <a:schemeClr val="lt1"/>
+            </a:fontRef>
+          </p:style>
+          <p:txBody>
+            <a:bodyPr rtlCol="0" anchor="ctr"/>
+            <a:lstStyle/>
+            <a:p>
+              <a:pPr algn="ctr"/>
+              <a:endParaRPr lang="en-US"/>
+            </a:p>
+          </p:txBody>
+        </p:sp>
+        <p:sp>
+          <p:nvSpPr>
+            <p:cNvPr id="42" name="Rectangle 41">
+              <a:extLst>
+                <a:ext uri="{FF2B5EF4-FFF2-40B4-BE49-F238E27FC236}">
+                  <a16:creationId xmlns:a16="http://schemas.microsoft.com/office/drawing/2014/main" id="{199F8878-8ED8-40E4-BC42-25CE78139C2D}"/>
+                </a:ext>
+              </a:extLst>
+            </p:cNvPr>
+            <p:cNvSpPr/>
+            <p:nvPr/>
+          </p:nvSpPr>
+          <p:spPr>
+            <a:xfrm>
+              <a:off x="5779950" y="2280890"/>
+              <a:ext cx="1942777" cy="2589072"/>
+            </a:xfrm>
+            <a:prstGeom prst="rect">
+              <a:avLst/>
+            </a:prstGeom>
+            <a:solidFill>
+              <a:schemeClr val="bg1"/>
+            </a:solidFill>
+            <a:ln>
+              <a:solidFill>
+                <a:schemeClr val="tx1"/>
+              </a:solidFill>
+            </a:ln>
+          </p:spPr>
+          <p:style>
+            <a:lnRef idx="2">
+              <a:schemeClr val="accent1">
+                <a:shade val="50000"/>
+              </a:schemeClr>
+            </a:lnRef>
+            <a:fillRef idx="1">
+              <a:schemeClr val="accent1"/>
+            </a:fillRef>
+            <a:effectRef idx="0">
+              <a:schemeClr val="accent1"/>
+            </a:effectRef>
+            <a:fontRef idx="minor">
+              <a:schemeClr val="lt1"/>
+            </a:fontRef>
+          </p:style>
+          <p:txBody>
+            <a:bodyPr rtlCol="0" anchor="ctr"/>
+            <a:lstStyle/>
+            <a:p>
+              <a:pPr algn="ctr"/>
+              <a:endParaRPr lang="en-US"/>
+            </a:p>
+          </p:txBody>
+        </p:sp>
+        <p:pic>
+          <p:nvPicPr>
+            <p:cNvPr id="43" name="Picture 42" descr="A picture containing table, indoor&#10;&#10;Description automatically generated">
+              <a:extLst>
+                <a:ext uri="{FF2B5EF4-FFF2-40B4-BE49-F238E27FC236}">
+                  <a16:creationId xmlns:a16="http://schemas.microsoft.com/office/drawing/2014/main" id="{4E82673E-30A6-4654-93AE-BCDBD31CA584}"/>
+                </a:ext>
+              </a:extLst>
+            </p:cNvPr>
+            <p:cNvPicPr>
+              <a:picLocks noChangeAspect="1"/>
+            </p:cNvPicPr>
+            <p:nvPr/>
+          </p:nvPicPr>
+          <p:blipFill>
+            <a:blip r:embed="rId4">
+              <a:extLst>
+                <a:ext uri="{28A0092B-C50C-407E-A947-70E740481C1C}">
+                  <a14:useLocalDpi xmlns:a14="http://schemas.microsoft.com/office/drawing/2010/main" val="0"/>
+                </a:ext>
+              </a:extLst>
+            </a:blip>
+            <a:stretch>
+              <a:fillRect/>
+            </a:stretch>
+          </p:blipFill>
+          <p:spPr>
+            <a:xfrm>
+              <a:off x="5716564" y="2199601"/>
+              <a:ext cx="1942777" cy="2594867"/>
+            </a:xfrm>
+            <a:prstGeom prst="rect">
+              <a:avLst/>
+            </a:prstGeom>
+          </p:spPr>
+        </p:pic>
+      </p:grpSp>
+      <p:sp>
+        <p:nvSpPr>
+          <p:cNvPr id="49" name="Rectangle 48">
+            <a:extLst>
+              <a:ext uri="{FF2B5EF4-FFF2-40B4-BE49-F238E27FC236}">
+                <a16:creationId xmlns:a16="http://schemas.microsoft.com/office/drawing/2014/main" id="{FC8EA038-6B77-4A8F-B4ED-F53BCDD8BDA9}"/>
+              </a:ext>
+            </a:extLst>
+          </p:cNvPr>
+          <p:cNvSpPr/>
+          <p:nvPr/>
+        </p:nvSpPr>
+        <p:spPr>
+          <a:xfrm>
+            <a:off x="10049170" y="1583686"/>
+            <a:ext cx="817611" cy="1239643"/>
+          </a:xfrm>
+          <a:prstGeom prst="rect">
+            <a:avLst/>
+          </a:prstGeom>
+          <a:noFill/>
+          <a:ln w="38100">
+            <a:solidFill>
+              <a:srgbClr val="FFC000"/>
+            </a:solidFill>
+          </a:ln>
+        </p:spPr>
+        <p:style>
+          <a:lnRef idx="2">
+            <a:schemeClr val="accent1">
+              <a:shade val="50000"/>
+            </a:schemeClr>
+          </a:lnRef>
+          <a:fillRef idx="1">
+            <a:schemeClr val="accent1"/>
+          </a:fillRef>
+          <a:effectRef idx="0">
+            <a:schemeClr val="accent1"/>
+          </a:effectRef>
+          <a:fontRef idx="minor">
+            <a:schemeClr val="lt1"/>
+          </a:fontRef>
+        </p:style>
+        <p:txBody>
+          <a:bodyPr rtlCol="0" anchor="ctr"/>
+          <a:lstStyle/>
+          <a:p>
+            <a:pPr algn="ctr"/>
+            <a:endParaRPr lang="en-US"/>
+          </a:p>
+        </p:txBody>
+      </p:sp>
+      <p:sp>
+        <p:nvSpPr>
+          <p:cNvPr id="3" name="TextBox 2">
+            <a:extLst>
+              <a:ext uri="{FF2B5EF4-FFF2-40B4-BE49-F238E27FC236}">
+                <a16:creationId xmlns:a16="http://schemas.microsoft.com/office/drawing/2014/main" id="{07D303A0-8DBF-4BC3-9AFC-A4B52F91859C}"/>
+              </a:ext>
+            </a:extLst>
+          </p:cNvPr>
+          <p:cNvSpPr txBox="1"/>
+          <p:nvPr/>
+        </p:nvSpPr>
+        <p:spPr>
+          <a:xfrm>
+            <a:off x="10074676" y="2755797"/>
+            <a:ext cx="767069" cy="369332"/>
+          </a:xfrm>
+          <a:prstGeom prst="rect">
+            <a:avLst/>
+          </a:prstGeom>
+          <a:noFill/>
+        </p:spPr>
+        <p:txBody>
+          <a:bodyPr wrap="none" rtlCol="0">
+            <a:spAutoFit/>
+          </a:bodyPr>
+          <a:lstStyle/>
+          <a:p>
+            <a:r>
+              <a:rPr lang="en-US" b="1" dirty="0">
+                <a:solidFill>
+                  <a:srgbClr val="FFC000"/>
+                </a:solidFill>
+              </a:rPr>
+              <a:t>Bottle</a:t>
+            </a:r>
+            <a:endParaRPr lang="en-US" sz="1200" b="1" dirty="0">
+              <a:solidFill>
+                <a:srgbClr val="FFC000"/>
+              </a:solidFill>
+            </a:endParaRPr>
+          </a:p>
+        </p:txBody>
+      </p:sp>
+    </p:spTree>
+    <p:extLst>
+      <p:ext uri="{BB962C8B-B14F-4D97-AF65-F5344CB8AC3E}">
+        <p14:creationId xmlns:p14="http://schemas.microsoft.com/office/powerpoint/2010/main" val="2821252022"/>
       </p:ext>
     </p:extLst>
   </p:cSld>

</xml_diff>